<commit_message>
removed ugly line in titlescreen
</commit_message>
<xml_diff>
--- a/doc/task02/presentation.pptx
+++ b/doc/task02/presentation.pptx
@@ -2,7 +2,7 @@
 <file path=ppt/presentation.xml><?xml version="1.0" encoding="utf-8"?>
 <p:presentation xmlns:a="http://schemas.openxmlformats.org/drawingml/2006/main" xmlns:r="http://schemas.openxmlformats.org/officeDocument/2006/relationships" xmlns:p="http://schemas.openxmlformats.org/presentationml/2006/main" saveSubsetFonts="1" autoCompressPictures="0">
   <p:sldMasterIdLst>
-    <p:sldMasterId id="2147483672" r:id="rId1"/>
+    <p:sldMasterId id="2147483684" r:id="rId1"/>
   </p:sldMasterIdLst>
   <p:sldIdLst>
     <p:sldId id="256" r:id="rId2"/>
@@ -111,11 +111,16 @@
       </a:defRPr>
     </a:lvl9pPr>
   </p:defaultTextStyle>
+  <p:extLst>
+    <p:ext uri="{EFAFB233-063F-42B5-8137-9DF3F51BA10A}">
+      <p15:sldGuideLst xmlns:p15="http://schemas.microsoft.com/office/powerpoint/2012/main"/>
+    </p:ext>
+  </p:extLst>
 </p:presentation>
 </file>
 
 <file path=ppt/slideLayouts/slideLayout1.xml><?xml version="1.0" encoding="utf-8"?>
-<p:sldLayout xmlns:a="http://schemas.openxmlformats.org/drawingml/2006/main" xmlns:r="http://schemas.openxmlformats.org/officeDocument/2006/relationships" xmlns:p="http://schemas.openxmlformats.org/presentationml/2006/main" type="title" preserve="1">
+<p:sldLayout xmlns:a="http://schemas.openxmlformats.org/drawingml/2006/main" xmlns:r="http://schemas.openxmlformats.org/officeDocument/2006/relationships" xmlns:p="http://schemas.openxmlformats.org/presentationml/2006/main" showMasterSp="0" type="title" preserve="1">
   <p:cSld name="Title Slide">
     <p:spTree>
       <p:nvGrpSpPr>
@@ -133,25 +138,113 @@
       </p:grpSpPr>
       <p:sp>
         <p:nvSpPr>
-          <p:cNvPr id="2" name="Title 1"/>
-          <p:cNvSpPr>
-            <a:spLocks noGrp="1"/>
-          </p:cNvSpPr>
-          <p:nvPr>
-            <p:ph type="ctrTitle"/>
-          </p:nvPr>
+          <p:cNvPr id="7" name="Rectangle 6"/>
+          <p:cNvSpPr/>
+          <p:nvPr/>
         </p:nvSpPr>
         <p:spPr>
           <a:xfrm>
-            <a:off x="1524000" y="1122363"/>
-            <a:ext cx="9144000" cy="2387600"/>
+            <a:off x="3175" y="6400800"/>
+            <a:ext cx="12188825" cy="457200"/>
+          </a:xfrm>
+          <a:prstGeom prst="rect">
+            <a:avLst/>
+          </a:prstGeom>
+          <a:solidFill>
+            <a:schemeClr val="accent2"/>
+          </a:solidFill>
+          <a:ln>
+            <a:noFill/>
+          </a:ln>
+        </p:spPr>
+        <p:style>
+          <a:lnRef idx="2">
+            <a:schemeClr val="accent1">
+              <a:shade val="50000"/>
+            </a:schemeClr>
+          </a:lnRef>
+          <a:fillRef idx="1">
+            <a:schemeClr val="accent1"/>
+          </a:fillRef>
+          <a:effectRef idx="0">
+            <a:schemeClr val="accent1"/>
+          </a:effectRef>
+          <a:fontRef idx="minor">
+            <a:schemeClr val="lt1"/>
+          </a:fontRef>
+        </p:style>
+      </p:sp>
+      <p:sp>
+        <p:nvSpPr>
+          <p:cNvPr id="8" name="Rectangle 7"/>
+          <p:cNvSpPr/>
+          <p:nvPr/>
+        </p:nvSpPr>
+        <p:spPr>
+          <a:xfrm>
+            <a:off x="15" y="6334316"/>
+            <a:ext cx="12188825" cy="64008"/>
+          </a:xfrm>
+          <a:prstGeom prst="rect">
+            <a:avLst/>
+          </a:prstGeom>
+          <a:solidFill>
+            <a:schemeClr val="accent1"/>
+          </a:solidFill>
+          <a:ln>
+            <a:noFill/>
+          </a:ln>
+        </p:spPr>
+        <p:style>
+          <a:lnRef idx="2">
+            <a:schemeClr val="accent1">
+              <a:shade val="50000"/>
+            </a:schemeClr>
+          </a:lnRef>
+          <a:fillRef idx="1">
+            <a:schemeClr val="accent1"/>
+          </a:fillRef>
+          <a:effectRef idx="0">
+            <a:schemeClr val="accent1"/>
+          </a:effectRef>
+          <a:fontRef idx="minor">
+            <a:schemeClr val="lt1"/>
+          </a:fontRef>
+        </p:style>
+      </p:sp>
+      <p:sp>
+        <p:nvSpPr>
+          <p:cNvPr id="2" name="Title 1"/>
+          <p:cNvSpPr>
+            <a:spLocks noGrp="1"/>
+          </p:cNvSpPr>
+          <p:nvPr>
+            <p:ph type="ctrTitle"/>
+          </p:nvPr>
+        </p:nvSpPr>
+        <p:spPr>
+          <a:xfrm>
+            <a:off x="1097280" y="758952"/>
+            <a:ext cx="10058400" cy="3566160"/>
           </a:xfrm>
         </p:spPr>
         <p:txBody>
-          <a:bodyPr anchor="b"/>
+          <a:bodyPr anchor="b">
+            <a:normAutofit/>
+          </a:bodyPr>
           <a:lstStyle>
-            <a:lvl1pPr algn="ctr">
-              <a:defRPr sz="6000"/>
+            <a:lvl1pPr algn="l">
+              <a:lnSpc>
+                <a:spcPct val="85000"/>
+              </a:lnSpc>
+              <a:defRPr sz="8000" spc="-50" baseline="0">
+                <a:solidFill>
+                  <a:schemeClr val="tx1">
+                    <a:lumMod val="85000"/>
+                    <a:lumOff val="15000"/>
+                  </a:schemeClr>
+                </a:solidFill>
+              </a:defRPr>
             </a:lvl1pPr>
           </a:lstStyle>
           <a:p>
@@ -159,7 +252,7 @@
               <a:rPr lang="en-US" smtClean="0"/>
               <a:t>Click to edit Master title style</a:t>
             </a:r>
-            <a:endParaRPr lang="en-US"/>
+            <a:endParaRPr lang="en-US" dirty="0"/>
           </a:p>
         </p:txBody>
       </p:sp>
@@ -175,48 +268,55 @@
         </p:nvSpPr>
         <p:spPr>
           <a:xfrm>
-            <a:off x="1524000" y="3602038"/>
-            <a:ext cx="9144000" cy="1655762"/>
+            <a:off x="1100051" y="4455620"/>
+            <a:ext cx="10058400" cy="1143000"/>
           </a:xfrm>
         </p:spPr>
         <p:txBody>
-          <a:bodyPr/>
+          <a:bodyPr lIns="91440" rIns="91440">
+            <a:normAutofit/>
+          </a:bodyPr>
           <a:lstStyle>
-            <a:lvl1pPr marL="0" indent="0" algn="ctr">
-              <a:buNone/>
-              <a:defRPr sz="2400"/>
+            <a:lvl1pPr marL="0" indent="0" algn="l">
+              <a:buNone/>
+              <a:defRPr sz="2400" cap="all" spc="200" baseline="0">
+                <a:solidFill>
+                  <a:schemeClr val="tx2"/>
+                </a:solidFill>
+                <a:latin typeface="+mj-lt"/>
+              </a:defRPr>
             </a:lvl1pPr>
             <a:lvl2pPr marL="457200" indent="0" algn="ctr">
               <a:buNone/>
-              <a:defRPr sz="2000"/>
+              <a:defRPr sz="2400"/>
             </a:lvl2pPr>
             <a:lvl3pPr marL="914400" indent="0" algn="ctr">
               <a:buNone/>
-              <a:defRPr sz="1800"/>
+              <a:defRPr sz="2400"/>
             </a:lvl3pPr>
             <a:lvl4pPr marL="1371600" indent="0" algn="ctr">
               <a:buNone/>
-              <a:defRPr sz="1600"/>
+              <a:defRPr sz="2000"/>
             </a:lvl4pPr>
             <a:lvl5pPr marL="1828800" indent="0" algn="ctr">
               <a:buNone/>
-              <a:defRPr sz="1600"/>
+              <a:defRPr sz="2000"/>
             </a:lvl5pPr>
             <a:lvl6pPr marL="2286000" indent="0" algn="ctr">
               <a:buNone/>
-              <a:defRPr sz="1600"/>
+              <a:defRPr sz="2000"/>
             </a:lvl6pPr>
             <a:lvl7pPr marL="2743200" indent="0" algn="ctr">
               <a:buNone/>
-              <a:defRPr sz="1600"/>
+              <a:defRPr sz="2000"/>
             </a:lvl7pPr>
             <a:lvl8pPr marL="3200400" indent="0" algn="ctr">
               <a:buNone/>
-              <a:defRPr sz="1600"/>
+              <a:defRPr sz="2000"/>
             </a:lvl8pPr>
             <a:lvl9pPr marL="3657600" indent="0" algn="ctr">
               <a:buNone/>
-              <a:defRPr sz="1600"/>
+              <a:defRPr sz="2000"/>
             </a:lvl9pPr>
           </a:lstStyle>
           <a:p>
@@ -224,7 +324,7 @@
               <a:rPr lang="en-US" smtClean="0"/>
               <a:t>Click to edit Master subtitle style</a:t>
             </a:r>
-            <a:endParaRPr lang="en-US"/>
+            <a:endParaRPr lang="en-US" dirty="0"/>
           </a:p>
         </p:txBody>
       </p:sp>
@@ -296,13 +396,20 @@
     </p:spTree>
     <p:extLst>
       <p:ext uri="{BB962C8B-B14F-4D97-AF65-F5344CB8AC3E}">
-        <p14:creationId xmlns:p14="http://schemas.microsoft.com/office/powerpoint/2010/main" val="1116505105"/>
+        <p14:creationId xmlns:p14="http://schemas.microsoft.com/office/powerpoint/2010/main" val="2074886054"/>
       </p:ext>
     </p:extLst>
   </p:cSld>
   <p:clrMapOvr>
     <a:masterClrMapping/>
   </p:clrMapOvr>
+  <p:timing>
+    <p:tnLst>
+      <p:par>
+        <p:cTn id="1" dur="indefinite" restart="never" nodeType="tmRoot"/>
+      </p:par>
+    </p:tnLst>
+  </p:timing>
 </p:sldLayout>
 </file>
 
@@ -342,7 +449,7 @@
               <a:rPr lang="en-US" smtClean="0"/>
               <a:t>Click to edit Master title style</a:t>
             </a:r>
-            <a:endParaRPr lang="en-US"/>
+            <a:endParaRPr lang="en-US" dirty="0"/>
           </a:p>
         </p:txBody>
       </p:sp>
@@ -358,7 +465,7 @@
         </p:nvSpPr>
         <p:spPr/>
         <p:txBody>
-          <a:bodyPr vert="eaVert"/>
+          <a:bodyPr vert="eaVert" lIns="45720" tIns="0" rIns="45720" bIns="0"/>
           <a:lstStyle/>
           <a:p>
             <a:pPr lvl="0"/>
@@ -394,7 +501,7 @@
               <a:rPr lang="en-US" smtClean="0"/>
               <a:t>Fifth level</a:t>
             </a:r>
-            <a:endParaRPr lang="en-US"/>
+            <a:endParaRPr lang="en-US" dirty="0"/>
           </a:p>
         </p:txBody>
       </p:sp>
@@ -466,7 +573,7 @@
     </p:spTree>
     <p:extLst>
       <p:ext uri="{BB962C8B-B14F-4D97-AF65-F5344CB8AC3E}">
-        <p14:creationId xmlns:p14="http://schemas.microsoft.com/office/powerpoint/2010/main" val="1985841027"/>
+        <p14:creationId xmlns:p14="http://schemas.microsoft.com/office/powerpoint/2010/main" val="5821409"/>
       </p:ext>
     </p:extLst>
   </p:cSld>
@@ -477,7 +584,7 @@
 </file>
 
 <file path=ppt/slideLayouts/slideLayout11.xml><?xml version="1.0" encoding="utf-8"?>
-<p:sldLayout xmlns:a="http://schemas.openxmlformats.org/drawingml/2006/main" xmlns:r="http://schemas.openxmlformats.org/officeDocument/2006/relationships" xmlns:p="http://schemas.openxmlformats.org/presentationml/2006/main" type="vertTitleAndTx" preserve="1">
+<p:sldLayout xmlns:a="http://schemas.openxmlformats.org/drawingml/2006/main" xmlns:r="http://schemas.openxmlformats.org/officeDocument/2006/relationships" xmlns:p="http://schemas.openxmlformats.org/presentationml/2006/main" showMasterSp="0" type="vertTitleAndTx" preserve="1">
   <p:cSld name="Vertical Title and Text">
     <p:spTree>
       <p:nvGrpSpPr>
@@ -495,18 +602,94 @@
       </p:grpSpPr>
       <p:sp>
         <p:nvSpPr>
-          <p:cNvPr id="2" name="Vertical Title 1"/>
-          <p:cNvSpPr>
-            <a:spLocks noGrp="1"/>
-          </p:cNvSpPr>
-          <p:nvPr>
-            <p:ph type="title" orient="vert"/>
-          </p:nvPr>
+          <p:cNvPr id="7" name="Rectangle 6"/>
+          <p:cNvSpPr/>
+          <p:nvPr/>
         </p:nvSpPr>
         <p:spPr>
           <a:xfrm>
-            <a:off x="8724900" y="365125"/>
-            <a:ext cx="2628900" cy="5811838"/>
+            <a:off x="3175" y="6400800"/>
+            <a:ext cx="12188825" cy="457200"/>
+          </a:xfrm>
+          <a:prstGeom prst="rect">
+            <a:avLst/>
+          </a:prstGeom>
+          <a:solidFill>
+            <a:schemeClr val="accent2"/>
+          </a:solidFill>
+          <a:ln>
+            <a:noFill/>
+          </a:ln>
+        </p:spPr>
+        <p:style>
+          <a:lnRef idx="2">
+            <a:schemeClr val="accent1">
+              <a:shade val="50000"/>
+            </a:schemeClr>
+          </a:lnRef>
+          <a:fillRef idx="1">
+            <a:schemeClr val="accent1"/>
+          </a:fillRef>
+          <a:effectRef idx="0">
+            <a:schemeClr val="accent1"/>
+          </a:effectRef>
+          <a:fontRef idx="minor">
+            <a:schemeClr val="lt1"/>
+          </a:fontRef>
+        </p:style>
+      </p:sp>
+      <p:sp>
+        <p:nvSpPr>
+          <p:cNvPr id="8" name="Rectangle 7"/>
+          <p:cNvSpPr/>
+          <p:nvPr/>
+        </p:nvSpPr>
+        <p:spPr>
+          <a:xfrm>
+            <a:off x="15" y="6334316"/>
+            <a:ext cx="12188825" cy="64008"/>
+          </a:xfrm>
+          <a:prstGeom prst="rect">
+            <a:avLst/>
+          </a:prstGeom>
+          <a:solidFill>
+            <a:schemeClr val="accent1"/>
+          </a:solidFill>
+          <a:ln>
+            <a:noFill/>
+          </a:ln>
+        </p:spPr>
+        <p:style>
+          <a:lnRef idx="2">
+            <a:schemeClr val="accent1">
+              <a:shade val="50000"/>
+            </a:schemeClr>
+          </a:lnRef>
+          <a:fillRef idx="1">
+            <a:schemeClr val="accent1"/>
+          </a:fillRef>
+          <a:effectRef idx="0">
+            <a:schemeClr val="accent1"/>
+          </a:effectRef>
+          <a:fontRef idx="minor">
+            <a:schemeClr val="lt1"/>
+          </a:fontRef>
+        </p:style>
+      </p:sp>
+      <p:sp>
+        <p:nvSpPr>
+          <p:cNvPr id="2" name="Vertical Title 1"/>
+          <p:cNvSpPr>
+            <a:spLocks noGrp="1"/>
+          </p:cNvSpPr>
+          <p:nvPr>
+            <p:ph type="title" orient="vert"/>
+          </p:nvPr>
+        </p:nvSpPr>
+        <p:spPr>
+          <a:xfrm>
+            <a:off x="8724900" y="414778"/>
+            <a:ext cx="2628900" cy="5757421"/>
           </a:xfrm>
         </p:spPr>
         <p:txBody>
@@ -517,7 +700,7 @@
               <a:rPr lang="en-US" smtClean="0"/>
               <a:t>Click to edit Master title style</a:t>
             </a:r>
-            <a:endParaRPr lang="en-US"/>
+            <a:endParaRPr lang="en-US" dirty="0"/>
           </a:p>
         </p:txBody>
       </p:sp>
@@ -533,12 +716,12 @@
         </p:nvSpPr>
         <p:spPr>
           <a:xfrm>
-            <a:off x="838200" y="365125"/>
-            <a:ext cx="7734300" cy="5811838"/>
+            <a:off x="838200" y="414778"/>
+            <a:ext cx="7734300" cy="5757422"/>
           </a:xfrm>
         </p:spPr>
         <p:txBody>
-          <a:bodyPr vert="eaVert"/>
+          <a:bodyPr vert="eaVert" lIns="45720" tIns="0" rIns="45720" bIns="0"/>
           <a:lstStyle/>
           <a:p>
             <a:pPr lvl="0"/>
@@ -574,7 +757,7 @@
               <a:rPr lang="en-US" smtClean="0"/>
               <a:t>Fifth level</a:t>
             </a:r>
-            <a:endParaRPr lang="en-US"/>
+            <a:endParaRPr lang="en-US" dirty="0"/>
           </a:p>
         </p:txBody>
       </p:sp>
@@ -646,7 +829,7 @@
     </p:spTree>
     <p:extLst>
       <p:ext uri="{BB962C8B-B14F-4D97-AF65-F5344CB8AC3E}">
-        <p14:creationId xmlns:p14="http://schemas.microsoft.com/office/powerpoint/2010/main" val="1986782762"/>
+        <p14:creationId xmlns:p14="http://schemas.microsoft.com/office/powerpoint/2010/main" val="1203656948"/>
       </p:ext>
     </p:extLst>
   </p:cSld>
@@ -686,13 +869,17 @@
         <p:spPr/>
         <p:txBody>
           <a:bodyPr/>
-          <a:lstStyle/>
+          <a:lstStyle>
+            <a:lvl1pPr marL="0">
+              <a:defRPr/>
+            </a:lvl1pPr>
+          </a:lstStyle>
           <a:p>
             <a:r>
               <a:rPr lang="en-US" smtClean="0"/>
               <a:t>Click to edit Master title style</a:t>
             </a:r>
-            <a:endParaRPr lang="en-US"/>
+            <a:endParaRPr lang="en-US" dirty="0"/>
           </a:p>
         </p:txBody>
       </p:sp>
@@ -744,7 +931,7 @@
               <a:rPr lang="en-US" smtClean="0"/>
               <a:t>Fifth level</a:t>
             </a:r>
-            <a:endParaRPr lang="en-US"/>
+            <a:endParaRPr lang="en-US" dirty="0"/>
           </a:p>
         </p:txBody>
       </p:sp>
@@ -813,22 +1000,138 @@
           </a:p>
         </p:txBody>
       </p:sp>
+      <p:grpSp>
+        <p:nvGrpSpPr>
+          <p:cNvPr id="7" name="Group 6"/>
+          <p:cNvGrpSpPr/>
+          <p:nvPr userDrawn="1"/>
+        </p:nvGrpSpPr>
+        <p:grpSpPr>
+          <a:xfrm>
+            <a:off x="10238652" y="-71353"/>
+            <a:ext cx="1834055" cy="1834055"/>
+            <a:chOff x="2332538" y="103305"/>
+            <a:chExt cx="6568660" cy="6568660"/>
+          </a:xfrm>
+        </p:grpSpPr>
+        <p:pic>
+          <p:nvPicPr>
+            <p:cNvPr id="8" name="Picture 7"/>
+            <p:cNvPicPr>
+              <a:picLocks noChangeAspect="1"/>
+            </p:cNvPicPr>
+            <p:nvPr/>
+          </p:nvPicPr>
+          <p:blipFill>
+            <a:blip r:embed="rId2">
+              <a:alphaModFix/>
+              <a:duotone>
+                <a:schemeClr val="accent1">
+                  <a:shade val="45000"/>
+                  <a:satMod val="135000"/>
+                </a:schemeClr>
+                <a:prstClr val="white"/>
+              </a:duotone>
+            </a:blip>
+            <a:stretch>
+              <a:fillRect/>
+            </a:stretch>
+          </p:blipFill>
+          <p:spPr>
+            <a:xfrm>
+              <a:off x="2332538" y="103305"/>
+              <a:ext cx="6568660" cy="6568660"/>
+            </a:xfrm>
+            <a:prstGeom prst="rect">
+              <a:avLst/>
+            </a:prstGeom>
+            <a:ln>
+              <a:noFill/>
+            </a:ln>
+            <a:effectLst>
+              <a:outerShdw blurRad="292100" dist="139700" dir="2700000" algn="tl" rotWithShape="0">
+                <a:srgbClr val="333333">
+                  <a:alpha val="65000"/>
+                </a:srgbClr>
+              </a:outerShdw>
+            </a:effectLst>
+          </p:spPr>
+        </p:pic>
+        <p:pic>
+          <p:nvPicPr>
+            <p:cNvPr id="9" name="Picture 8"/>
+            <p:cNvPicPr>
+              <a:picLocks noChangeAspect="1"/>
+            </p:cNvPicPr>
+            <p:nvPr/>
+          </p:nvPicPr>
+          <p:blipFill>
+            <a:blip r:embed="rId3">
+              <a:clrChange>
+                <a:clrFrom>
+                  <a:srgbClr val="FFFFFF"/>
+                </a:clrFrom>
+                <a:clrTo>
+                  <a:srgbClr val="FFFFFF">
+                    <a:alpha val="0"/>
+                  </a:srgbClr>
+                </a:clrTo>
+              </a:clrChange>
+              <a:alphaModFix/>
+              <a:duotone>
+                <a:schemeClr val="accent2">
+                  <a:shade val="45000"/>
+                  <a:satMod val="135000"/>
+                </a:schemeClr>
+                <a:prstClr val="white"/>
+              </a:duotone>
+            </a:blip>
+            <a:stretch>
+              <a:fillRect/>
+            </a:stretch>
+          </p:blipFill>
+          <p:spPr>
+            <a:xfrm rot="158011">
+              <a:off x="4489134" y="1500804"/>
+              <a:ext cx="1557265" cy="1515613"/>
+            </a:xfrm>
+            <a:prstGeom prst="rect">
+              <a:avLst/>
+            </a:prstGeom>
+          </p:spPr>
+        </p:pic>
+      </p:grpSp>
     </p:spTree>
     <p:extLst>
       <p:ext uri="{BB962C8B-B14F-4D97-AF65-F5344CB8AC3E}">
-        <p14:creationId xmlns:p14="http://schemas.microsoft.com/office/powerpoint/2010/main" val="389192249"/>
+        <p14:creationId xmlns:p14="http://schemas.microsoft.com/office/powerpoint/2010/main" val="1770449592"/>
       </p:ext>
     </p:extLst>
   </p:cSld>
   <p:clrMapOvr>
     <a:masterClrMapping/>
   </p:clrMapOvr>
+  <p:timing>
+    <p:tnLst>
+      <p:par>
+        <p:cTn id="1" dur="indefinite" restart="never" nodeType="tmRoot"/>
+      </p:par>
+    </p:tnLst>
+  </p:timing>
 </p:sldLayout>
 </file>
 
 <file path=ppt/slideLayouts/slideLayout3.xml><?xml version="1.0" encoding="utf-8"?>
-<p:sldLayout xmlns:a="http://schemas.openxmlformats.org/drawingml/2006/main" xmlns:r="http://schemas.openxmlformats.org/officeDocument/2006/relationships" xmlns:p="http://schemas.openxmlformats.org/presentationml/2006/main" type="secHead" preserve="1">
+<p:sldLayout xmlns:a="http://schemas.openxmlformats.org/drawingml/2006/main" xmlns:r="http://schemas.openxmlformats.org/officeDocument/2006/relationships" xmlns:p="http://schemas.openxmlformats.org/presentationml/2006/main" showMasterSp="0" type="secHead" preserve="1">
   <p:cSld name="Section Header">
+    <p:bg>
+      <p:bgPr>
+        <a:solidFill>
+          <a:schemeClr val="bg1"/>
+        </a:solidFill>
+        <a:effectLst/>
+      </p:bgPr>
+    </p:bg>
     <p:spTree>
       <p:nvGrpSpPr>
         <p:cNvPr id="1" name=""/>
@@ -845,68 +1148,157 @@
       </p:grpSpPr>
       <p:sp>
         <p:nvSpPr>
-          <p:cNvPr id="2" name="Title 1"/>
-          <p:cNvSpPr>
-            <a:spLocks noGrp="1"/>
-          </p:cNvSpPr>
-          <p:nvPr>
-            <p:ph type="title"/>
-          </p:nvPr>
+          <p:cNvPr id="7" name="Rectangle 6"/>
+          <p:cNvSpPr/>
+          <p:nvPr/>
         </p:nvSpPr>
         <p:spPr>
           <a:xfrm>
-            <a:off x="831850" y="1709738"/>
-            <a:ext cx="10515600" cy="2852737"/>
+            <a:off x="3175" y="6400800"/>
+            <a:ext cx="12188825" cy="457200"/>
+          </a:xfrm>
+          <a:prstGeom prst="rect">
+            <a:avLst/>
+          </a:prstGeom>
+          <a:solidFill>
+            <a:schemeClr val="accent2"/>
+          </a:solidFill>
+          <a:ln>
+            <a:noFill/>
+          </a:ln>
+        </p:spPr>
+        <p:style>
+          <a:lnRef idx="2">
+            <a:schemeClr val="accent1">
+              <a:shade val="50000"/>
+            </a:schemeClr>
+          </a:lnRef>
+          <a:fillRef idx="1">
+            <a:schemeClr val="accent1"/>
+          </a:fillRef>
+          <a:effectRef idx="0">
+            <a:schemeClr val="accent1"/>
+          </a:effectRef>
+          <a:fontRef idx="minor">
+            <a:schemeClr val="lt1"/>
+          </a:fontRef>
+        </p:style>
+      </p:sp>
+      <p:sp>
+        <p:nvSpPr>
+          <p:cNvPr id="8" name="Rectangle 7"/>
+          <p:cNvSpPr/>
+          <p:nvPr/>
+        </p:nvSpPr>
+        <p:spPr>
+          <a:xfrm>
+            <a:off x="15" y="6334316"/>
+            <a:ext cx="12188825" cy="64008"/>
+          </a:xfrm>
+          <a:prstGeom prst="rect">
+            <a:avLst/>
+          </a:prstGeom>
+          <a:solidFill>
+            <a:schemeClr val="accent1"/>
+          </a:solidFill>
+          <a:ln>
+            <a:noFill/>
+          </a:ln>
+        </p:spPr>
+        <p:style>
+          <a:lnRef idx="2">
+            <a:schemeClr val="accent1">
+              <a:shade val="50000"/>
+            </a:schemeClr>
+          </a:lnRef>
+          <a:fillRef idx="1">
+            <a:schemeClr val="accent1"/>
+          </a:fillRef>
+          <a:effectRef idx="0">
+            <a:schemeClr val="accent1"/>
+          </a:effectRef>
+          <a:fontRef idx="minor">
+            <a:schemeClr val="lt1"/>
+          </a:fontRef>
+        </p:style>
+      </p:sp>
+      <p:sp>
+        <p:nvSpPr>
+          <p:cNvPr id="2" name="Title 1"/>
+          <p:cNvSpPr>
+            <a:spLocks noGrp="1"/>
+          </p:cNvSpPr>
+          <p:nvPr>
+            <p:ph type="title"/>
+          </p:nvPr>
+        </p:nvSpPr>
+        <p:spPr>
+          <a:xfrm>
+            <a:off x="1097280" y="758952"/>
+            <a:ext cx="10058400" cy="3566160"/>
           </a:xfrm>
         </p:spPr>
         <p:txBody>
-          <a:bodyPr anchor="b"/>
+          <a:bodyPr anchor="b" anchorCtr="0">
+            <a:normAutofit/>
+          </a:bodyPr>
           <a:lstStyle>
             <a:lvl1pPr>
-              <a:defRPr sz="6000"/>
-            </a:lvl1pPr>
-          </a:lstStyle>
-          <a:p>
-            <a:r>
-              <a:rPr lang="en-US" smtClean="0"/>
-              <a:t>Click to edit Master title style</a:t>
-            </a:r>
-            <a:endParaRPr lang="en-US"/>
-          </a:p>
-        </p:txBody>
-      </p:sp>
-      <p:sp>
-        <p:nvSpPr>
-          <p:cNvPr id="3" name="Text Placeholder 2"/>
-          <p:cNvSpPr>
-            <a:spLocks noGrp="1"/>
-          </p:cNvSpPr>
-          <p:nvPr>
-            <p:ph type="body" idx="1"/>
-          </p:nvPr>
-        </p:nvSpPr>
-        <p:spPr>
-          <a:xfrm>
-            <a:off x="831850" y="4589463"/>
-            <a:ext cx="10515600" cy="1500187"/>
-          </a:xfrm>
-        </p:spPr>
-        <p:txBody>
-          <a:bodyPr/>
-          <a:lstStyle>
-            <a:lvl1pPr marL="0" indent="0">
-              <a:buNone/>
-              <a:defRPr sz="2400">
+              <a:lnSpc>
+                <a:spcPct val="85000"/>
+              </a:lnSpc>
+              <a:defRPr sz="8000" b="0">
                 <a:solidFill>
                   <a:schemeClr val="tx1">
-                    <a:tint val="75000"/>
+                    <a:lumMod val="85000"/>
+                    <a:lumOff val="15000"/>
                   </a:schemeClr>
                 </a:solidFill>
               </a:defRPr>
             </a:lvl1pPr>
+          </a:lstStyle>
+          <a:p>
+            <a:r>
+              <a:rPr lang="en-US" smtClean="0"/>
+              <a:t>Click to edit Master title style</a:t>
+            </a:r>
+            <a:endParaRPr lang="en-US" dirty="0"/>
+          </a:p>
+        </p:txBody>
+      </p:sp>
+      <p:sp>
+        <p:nvSpPr>
+          <p:cNvPr id="3" name="Text Placeholder 2"/>
+          <p:cNvSpPr>
+            <a:spLocks noGrp="1"/>
+          </p:cNvSpPr>
+          <p:nvPr>
+            <p:ph type="body" idx="1"/>
+          </p:nvPr>
+        </p:nvSpPr>
+        <p:spPr>
+          <a:xfrm>
+            <a:off x="1097280" y="4453128"/>
+            <a:ext cx="10058400" cy="1143000"/>
+          </a:xfrm>
+        </p:spPr>
+        <p:txBody>
+          <a:bodyPr lIns="91440" rIns="91440" anchor="t" anchorCtr="0">
+            <a:normAutofit/>
+          </a:bodyPr>
+          <a:lstStyle>
+            <a:lvl1pPr marL="0" indent="0">
+              <a:buNone/>
+              <a:defRPr sz="2400" cap="all" spc="200" baseline="0">
+                <a:solidFill>
+                  <a:schemeClr val="tx2"/>
+                </a:solidFill>
+                <a:latin typeface="+mj-lt"/>
+              </a:defRPr>
+            </a:lvl1pPr>
             <a:lvl2pPr marL="457200" indent="0">
               <a:buNone/>
-              <a:defRPr sz="2000">
+              <a:defRPr sz="1800">
                 <a:solidFill>
                   <a:schemeClr val="tx1">
                     <a:tint val="75000"/>
@@ -916,7 +1308,7 @@
             </a:lvl2pPr>
             <a:lvl3pPr marL="914400" indent="0">
               <a:buNone/>
-              <a:defRPr sz="1800">
+              <a:defRPr sz="1600">
                 <a:solidFill>
                   <a:schemeClr val="tx1">
                     <a:tint val="75000"/>
@@ -926,7 +1318,7 @@
             </a:lvl3pPr>
             <a:lvl4pPr marL="1371600" indent="0">
               <a:buNone/>
-              <a:defRPr sz="1600">
+              <a:defRPr sz="1400">
                 <a:solidFill>
                   <a:schemeClr val="tx1">
                     <a:tint val="75000"/>
@@ -936,7 +1328,7 @@
             </a:lvl4pPr>
             <a:lvl5pPr marL="1828800" indent="0">
               <a:buNone/>
-              <a:defRPr sz="1600">
+              <a:defRPr sz="1400">
                 <a:solidFill>
                   <a:schemeClr val="tx1">
                     <a:tint val="75000"/>
@@ -946,7 +1338,7 @@
             </a:lvl5pPr>
             <a:lvl6pPr marL="2286000" indent="0">
               <a:buNone/>
-              <a:defRPr sz="1600">
+              <a:defRPr sz="1400">
                 <a:solidFill>
                   <a:schemeClr val="tx1">
                     <a:tint val="75000"/>
@@ -956,7 +1348,7 @@
             </a:lvl6pPr>
             <a:lvl7pPr marL="2743200" indent="0">
               <a:buNone/>
-              <a:defRPr sz="1600">
+              <a:defRPr sz="1400">
                 <a:solidFill>
                   <a:schemeClr val="tx1">
                     <a:tint val="75000"/>
@@ -966,7 +1358,7 @@
             </a:lvl7pPr>
             <a:lvl8pPr marL="3200400" indent="0">
               <a:buNone/>
-              <a:defRPr sz="1600">
+              <a:defRPr sz="1400">
                 <a:solidFill>
                   <a:schemeClr val="tx1">
                     <a:tint val="75000"/>
@@ -976,7 +1368,7 @@
             </a:lvl8pPr>
             <a:lvl9pPr marL="3657600" indent="0">
               <a:buNone/>
-              <a:defRPr sz="1600">
+              <a:defRPr sz="1400">
                 <a:solidFill>
                   <a:schemeClr val="tx1">
                     <a:tint val="75000"/>
@@ -1059,10 +1451,48 @@
           </a:p>
         </p:txBody>
       </p:sp>
+      <p:cxnSp>
+        <p:nvCxnSpPr>
+          <p:cNvPr id="9" name="Straight Connector 8"/>
+          <p:cNvCxnSpPr/>
+          <p:nvPr/>
+        </p:nvCxnSpPr>
+        <p:spPr>
+          <a:xfrm>
+            <a:off x="1207658" y="4343400"/>
+            <a:ext cx="9875520" cy="0"/>
+          </a:xfrm>
+          <a:prstGeom prst="line">
+            <a:avLst/>
+          </a:prstGeom>
+          <a:ln w="6350">
+            <a:solidFill>
+              <a:schemeClr val="tx1">
+                <a:lumMod val="50000"/>
+                <a:lumOff val="50000"/>
+              </a:schemeClr>
+            </a:solidFill>
+          </a:ln>
+        </p:spPr>
+        <p:style>
+          <a:lnRef idx="1">
+            <a:schemeClr val="accent1"/>
+          </a:lnRef>
+          <a:fillRef idx="0">
+            <a:schemeClr val="accent1"/>
+          </a:fillRef>
+          <a:effectRef idx="0">
+            <a:schemeClr val="accent1"/>
+          </a:effectRef>
+          <a:fontRef idx="minor">
+            <a:schemeClr val="tx1"/>
+          </a:fontRef>
+        </p:style>
+      </p:cxnSp>
     </p:spTree>
     <p:extLst>
       <p:ext uri="{BB962C8B-B14F-4D97-AF65-F5344CB8AC3E}">
-        <p14:creationId xmlns:p14="http://schemas.microsoft.com/office/powerpoint/2010/main" val="2066423828"/>
+        <p14:creationId xmlns:p14="http://schemas.microsoft.com/office/powerpoint/2010/main" val="412879912"/>
       </p:ext>
     </p:extLst>
   </p:cSld>
@@ -1091,98 +1521,46 @@
       </p:grpSpPr>
       <p:sp>
         <p:nvSpPr>
-          <p:cNvPr id="2" name="Title 1"/>
+          <p:cNvPr id="8" name="Title 7"/>
           <p:cNvSpPr>
             <a:spLocks noGrp="1"/>
           </p:cNvSpPr>
           <p:nvPr>
             <p:ph type="title"/>
-          </p:nvPr>
-        </p:nvSpPr>
-        <p:spPr/>
-        <p:txBody>
-          <a:bodyPr/>
-          <a:lstStyle/>
-          <a:p>
-            <a:r>
-              <a:rPr lang="en-US" smtClean="0"/>
-              <a:t>Click to edit Master title style</a:t>
-            </a:r>
-            <a:endParaRPr lang="en-US"/>
-          </a:p>
-        </p:txBody>
-      </p:sp>
-      <p:sp>
-        <p:nvSpPr>
-          <p:cNvPr id="3" name="Content Placeholder 2"/>
-          <p:cNvSpPr>
-            <a:spLocks noGrp="1"/>
-          </p:cNvSpPr>
-          <p:nvPr>
-            <p:ph sz="half" idx="1"/>
           </p:nvPr>
         </p:nvSpPr>
         <p:spPr>
           <a:xfrm>
-            <a:off x="838200" y="1825625"/>
-            <a:ext cx="5181600" cy="4351338"/>
+            <a:off x="1097280" y="286603"/>
+            <a:ext cx="10058400" cy="1450757"/>
           </a:xfrm>
         </p:spPr>
         <p:txBody>
           <a:bodyPr/>
           <a:lstStyle/>
           <a:p>
-            <a:pPr lvl="0"/>
-            <a:r>
-              <a:rPr lang="en-US" smtClean="0"/>
-              <a:t>Click to edit Master text styles</a:t>
-            </a:r>
-          </a:p>
-          <a:p>
-            <a:pPr lvl="1"/>
-            <a:r>
-              <a:rPr lang="en-US" smtClean="0"/>
-              <a:t>Second level</a:t>
-            </a:r>
-          </a:p>
-          <a:p>
-            <a:pPr lvl="2"/>
-            <a:r>
-              <a:rPr lang="en-US" smtClean="0"/>
-              <a:t>Third level</a:t>
-            </a:r>
-          </a:p>
-          <a:p>
-            <a:pPr lvl="3"/>
-            <a:r>
-              <a:rPr lang="en-US" smtClean="0"/>
-              <a:t>Fourth level</a:t>
-            </a:r>
-          </a:p>
-          <a:p>
-            <a:pPr lvl="4"/>
-            <a:r>
-              <a:rPr lang="en-US" smtClean="0"/>
-              <a:t>Fifth level</a:t>
-            </a:r>
-            <a:endParaRPr lang="en-US"/>
-          </a:p>
-        </p:txBody>
-      </p:sp>
-      <p:sp>
-        <p:nvSpPr>
-          <p:cNvPr id="4" name="Content Placeholder 3"/>
-          <p:cNvSpPr>
-            <a:spLocks noGrp="1"/>
-          </p:cNvSpPr>
-          <p:nvPr>
-            <p:ph sz="half" idx="2"/>
+            <a:r>
+              <a:rPr lang="en-US" smtClean="0"/>
+              <a:t>Click to edit Master title style</a:t>
+            </a:r>
+            <a:endParaRPr lang="en-US" dirty="0"/>
+          </a:p>
+        </p:txBody>
+      </p:sp>
+      <p:sp>
+        <p:nvSpPr>
+          <p:cNvPr id="3" name="Content Placeholder 2"/>
+          <p:cNvSpPr>
+            <a:spLocks noGrp="1"/>
+          </p:cNvSpPr>
+          <p:nvPr>
+            <p:ph sz="half" idx="1"/>
           </p:nvPr>
         </p:nvSpPr>
         <p:spPr>
           <a:xfrm>
-            <a:off x="6172200" y="1825625"/>
-            <a:ext cx="5181600" cy="4351338"/>
+            <a:off x="1097279" y="1845734"/>
+            <a:ext cx="4937760" cy="4023360"/>
           </a:xfrm>
         </p:spPr>
         <p:txBody>
@@ -1222,7 +1600,64 @@
               <a:rPr lang="en-US" smtClean="0"/>
               <a:t>Fifth level</a:t>
             </a:r>
-            <a:endParaRPr lang="en-US"/>
+            <a:endParaRPr lang="en-US" dirty="0"/>
+          </a:p>
+        </p:txBody>
+      </p:sp>
+      <p:sp>
+        <p:nvSpPr>
+          <p:cNvPr id="4" name="Content Placeholder 3"/>
+          <p:cNvSpPr>
+            <a:spLocks noGrp="1"/>
+          </p:cNvSpPr>
+          <p:nvPr>
+            <p:ph sz="half" idx="2"/>
+          </p:nvPr>
+        </p:nvSpPr>
+        <p:spPr>
+          <a:xfrm>
+            <a:off x="6217920" y="1845735"/>
+            <a:ext cx="4937760" cy="4023360"/>
+          </a:xfrm>
+        </p:spPr>
+        <p:txBody>
+          <a:bodyPr/>
+          <a:lstStyle/>
+          <a:p>
+            <a:pPr lvl="0"/>
+            <a:r>
+              <a:rPr lang="en-US" smtClean="0"/>
+              <a:t>Click to edit Master text styles</a:t>
+            </a:r>
+          </a:p>
+          <a:p>
+            <a:pPr lvl="1"/>
+            <a:r>
+              <a:rPr lang="en-US" smtClean="0"/>
+              <a:t>Second level</a:t>
+            </a:r>
+          </a:p>
+          <a:p>
+            <a:pPr lvl="2"/>
+            <a:r>
+              <a:rPr lang="en-US" smtClean="0"/>
+              <a:t>Third level</a:t>
+            </a:r>
+          </a:p>
+          <a:p>
+            <a:pPr lvl="3"/>
+            <a:r>
+              <a:rPr lang="en-US" smtClean="0"/>
+              <a:t>Fourth level</a:t>
+            </a:r>
+          </a:p>
+          <a:p>
+            <a:pPr lvl="4"/>
+            <a:r>
+              <a:rPr lang="en-US" smtClean="0"/>
+              <a:t>Fifth level</a:t>
+            </a:r>
+            <a:endParaRPr lang="en-US" dirty="0"/>
           </a:p>
         </p:txBody>
       </p:sp>
@@ -1294,7 +1729,7 @@
     </p:spTree>
     <p:extLst>
       <p:ext uri="{BB962C8B-B14F-4D97-AF65-F5344CB8AC3E}">
-        <p14:creationId xmlns:p14="http://schemas.microsoft.com/office/powerpoint/2010/main" val="1279737912"/>
+        <p14:creationId xmlns:p14="http://schemas.microsoft.com/office/powerpoint/2010/main" val="753017527"/>
       </p:ext>
     </p:extLst>
   </p:cSld>
@@ -1323,7 +1758,7 @@
       </p:grpSpPr>
       <p:sp>
         <p:nvSpPr>
-          <p:cNvPr id="2" name="Title 1"/>
+          <p:cNvPr id="10" name="Title 9"/>
           <p:cNvSpPr>
             <a:spLocks noGrp="1"/>
           </p:cNvSpPr>
@@ -1333,8 +1768,8 @@
         </p:nvSpPr>
         <p:spPr>
           <a:xfrm>
-            <a:off x="839788" y="365125"/>
-            <a:ext cx="10515600" cy="1325563"/>
+            <a:off x="1097280" y="286603"/>
+            <a:ext cx="10058400" cy="1450757"/>
           </a:xfrm>
         </p:spPr>
         <p:txBody>
@@ -1345,7 +1780,7 @@
               <a:rPr lang="en-US" smtClean="0"/>
               <a:t>Click to edit Master title style</a:t>
             </a:r>
-            <a:endParaRPr lang="en-US"/>
+            <a:endParaRPr lang="en-US" dirty="0"/>
           </a:p>
         </p:txBody>
       </p:sp>
@@ -1361,16 +1796,22 @@
         </p:nvSpPr>
         <p:spPr>
           <a:xfrm>
-            <a:off x="839788" y="1681163"/>
-            <a:ext cx="5157787" cy="823912"/>
+            <a:off x="1097280" y="1846052"/>
+            <a:ext cx="4937760" cy="736282"/>
           </a:xfrm>
         </p:spPr>
         <p:txBody>
-          <a:bodyPr anchor="b"/>
+          <a:bodyPr lIns="91440" rIns="91440" anchor="ctr">
+            <a:normAutofit/>
+          </a:bodyPr>
           <a:lstStyle>
             <a:lvl1pPr marL="0" indent="0">
               <a:buNone/>
-              <a:defRPr sz="2400" b="1"/>
+              <a:defRPr sz="2000" b="0" cap="all" baseline="0">
+                <a:solidFill>
+                  <a:schemeClr val="tx2"/>
+                </a:solidFill>
+              </a:defRPr>
             </a:lvl1pPr>
             <a:lvl2pPr marL="457200" indent="0">
               <a:buNone/>
@@ -1426,8 +1867,8 @@
         </p:nvSpPr>
         <p:spPr>
           <a:xfrm>
-            <a:off x="839788" y="2505075"/>
-            <a:ext cx="5157787" cy="3684588"/>
+            <a:off x="1097280" y="2582334"/>
+            <a:ext cx="4937760" cy="3378200"/>
           </a:xfrm>
         </p:spPr>
         <p:txBody>
@@ -1467,7 +1908,7 @@
               <a:rPr lang="en-US" smtClean="0"/>
               <a:t>Fifth level</a:t>
             </a:r>
-            <a:endParaRPr lang="en-US"/>
+            <a:endParaRPr lang="en-US" dirty="0"/>
           </a:p>
         </p:txBody>
       </p:sp>
@@ -1483,16 +1924,22 @@
         </p:nvSpPr>
         <p:spPr>
           <a:xfrm>
-            <a:off x="6172200" y="1681163"/>
-            <a:ext cx="5183188" cy="823912"/>
+            <a:off x="6217920" y="1846052"/>
+            <a:ext cx="4937760" cy="736282"/>
           </a:xfrm>
         </p:spPr>
         <p:txBody>
-          <a:bodyPr anchor="b"/>
+          <a:bodyPr lIns="91440" rIns="91440" anchor="ctr">
+            <a:normAutofit/>
+          </a:bodyPr>
           <a:lstStyle>
             <a:lvl1pPr marL="0" indent="0">
               <a:buNone/>
-              <a:defRPr sz="2400" b="1"/>
+              <a:defRPr sz="2000" b="0" cap="all" baseline="0">
+                <a:solidFill>
+                  <a:schemeClr val="tx2"/>
+                </a:solidFill>
+              </a:defRPr>
             </a:lvl1pPr>
             <a:lvl2pPr marL="457200" indent="0">
               <a:buNone/>
@@ -1548,8 +1995,8 @@
         </p:nvSpPr>
         <p:spPr>
           <a:xfrm>
-            <a:off x="6172200" y="2505075"/>
-            <a:ext cx="5183188" cy="3684588"/>
+            <a:off x="6217920" y="2582334"/>
+            <a:ext cx="4937760" cy="3378200"/>
           </a:xfrm>
         </p:spPr>
         <p:txBody>
@@ -1589,7 +2036,7 @@
               <a:rPr lang="en-US" smtClean="0"/>
               <a:t>Fifth level</a:t>
             </a:r>
-            <a:endParaRPr lang="en-US"/>
+            <a:endParaRPr lang="en-US" dirty="0"/>
           </a:p>
         </p:txBody>
       </p:sp>
@@ -1661,7 +2108,7 @@
     </p:spTree>
     <p:extLst>
       <p:ext uri="{BB962C8B-B14F-4D97-AF65-F5344CB8AC3E}">
-        <p14:creationId xmlns:p14="http://schemas.microsoft.com/office/powerpoint/2010/main" val="1506362279"/>
+        <p14:creationId xmlns:p14="http://schemas.microsoft.com/office/powerpoint/2010/main" val="844444518"/>
       </p:ext>
     </p:extLst>
   </p:cSld>
@@ -1707,7 +2154,7 @@
               <a:rPr lang="en-US" smtClean="0"/>
               <a:t>Click to edit Master title style</a:t>
             </a:r>
-            <a:endParaRPr lang="en-US"/>
+            <a:endParaRPr lang="en-US" dirty="0"/>
           </a:p>
         </p:txBody>
       </p:sp>
@@ -1779,7 +2226,7 @@
     </p:spTree>
     <p:extLst>
       <p:ext uri="{BB962C8B-B14F-4D97-AF65-F5344CB8AC3E}">
-        <p14:creationId xmlns:p14="http://schemas.microsoft.com/office/powerpoint/2010/main" val="746108670"/>
+        <p14:creationId xmlns:p14="http://schemas.microsoft.com/office/powerpoint/2010/main" val="2007074650"/>
       </p:ext>
     </p:extLst>
   </p:cSld>
@@ -1790,7 +2237,7 @@
 </file>
 
 <file path=ppt/slideLayouts/slideLayout7.xml><?xml version="1.0" encoding="utf-8"?>
-<p:sldLayout xmlns:a="http://schemas.openxmlformats.org/drawingml/2006/main" xmlns:r="http://schemas.openxmlformats.org/officeDocument/2006/relationships" xmlns:p="http://schemas.openxmlformats.org/presentationml/2006/main" type="blank" preserve="1">
+<p:sldLayout xmlns:a="http://schemas.openxmlformats.org/drawingml/2006/main" xmlns:r="http://schemas.openxmlformats.org/officeDocument/2006/relationships" xmlns:p="http://schemas.openxmlformats.org/presentationml/2006/main" showMasterSp="0" type="blank" preserve="1">
   <p:cSld name="Blank">
     <p:spTree>
       <p:nvGrpSpPr>
@@ -1808,7 +2255,83 @@
       </p:grpSpPr>
       <p:sp>
         <p:nvSpPr>
-          <p:cNvPr id="2" name="Date Placeholder 1"/>
+          <p:cNvPr id="5" name="Rectangle 4"/>
+          <p:cNvSpPr/>
+          <p:nvPr/>
+        </p:nvSpPr>
+        <p:spPr>
+          <a:xfrm>
+            <a:off x="3175" y="6400800"/>
+            <a:ext cx="12188825" cy="457200"/>
+          </a:xfrm>
+          <a:prstGeom prst="rect">
+            <a:avLst/>
+          </a:prstGeom>
+          <a:solidFill>
+            <a:schemeClr val="accent2"/>
+          </a:solidFill>
+          <a:ln>
+            <a:noFill/>
+          </a:ln>
+        </p:spPr>
+        <p:style>
+          <a:lnRef idx="2">
+            <a:schemeClr val="accent1">
+              <a:shade val="50000"/>
+            </a:schemeClr>
+          </a:lnRef>
+          <a:fillRef idx="1">
+            <a:schemeClr val="accent1"/>
+          </a:fillRef>
+          <a:effectRef idx="0">
+            <a:schemeClr val="accent1"/>
+          </a:effectRef>
+          <a:fontRef idx="minor">
+            <a:schemeClr val="lt1"/>
+          </a:fontRef>
+        </p:style>
+      </p:sp>
+      <p:sp>
+        <p:nvSpPr>
+          <p:cNvPr id="6" name="Rectangle 5"/>
+          <p:cNvSpPr/>
+          <p:nvPr/>
+        </p:nvSpPr>
+        <p:spPr>
+          <a:xfrm>
+            <a:off x="15" y="6334316"/>
+            <a:ext cx="12188825" cy="64008"/>
+          </a:xfrm>
+          <a:prstGeom prst="rect">
+            <a:avLst/>
+          </a:prstGeom>
+          <a:solidFill>
+            <a:schemeClr val="accent1"/>
+          </a:solidFill>
+          <a:ln>
+            <a:noFill/>
+          </a:ln>
+        </p:spPr>
+        <p:style>
+          <a:lnRef idx="2">
+            <a:schemeClr val="accent1">
+              <a:shade val="50000"/>
+            </a:schemeClr>
+          </a:lnRef>
+          <a:fillRef idx="1">
+            <a:schemeClr val="accent1"/>
+          </a:fillRef>
+          <a:effectRef idx="0">
+            <a:schemeClr val="accent1"/>
+          </a:effectRef>
+          <a:fontRef idx="minor">
+            <a:schemeClr val="lt1"/>
+          </a:fontRef>
+        </p:style>
+      </p:sp>
+      <p:sp>
+        <p:nvSpPr>
+          <p:cNvPr id="7" name="Date Placeholder 6"/>
           <p:cNvSpPr>
             <a:spLocks noGrp="1"/>
           </p:cNvSpPr>
@@ -1831,7 +2354,7 @@
       </p:sp>
       <p:sp>
         <p:nvSpPr>
-          <p:cNvPr id="3" name="Footer Placeholder 2"/>
+          <p:cNvPr id="8" name="Footer Placeholder 7"/>
           <p:cNvSpPr>
             <a:spLocks noGrp="1"/>
           </p:cNvSpPr>
@@ -1842,7 +2365,15 @@
         <p:spPr/>
         <p:txBody>
           <a:bodyPr/>
-          <a:lstStyle/>
+          <a:lstStyle>
+            <a:lvl1pPr>
+              <a:defRPr>
+                <a:solidFill>
+                  <a:srgbClr val="FFFFFF"/>
+                </a:solidFill>
+              </a:defRPr>
+            </a:lvl1pPr>
+          </a:lstStyle>
           <a:p>
             <a:endParaRPr lang="en-US"/>
           </a:p>
@@ -1850,7 +2381,7 @@
       </p:sp>
       <p:sp>
         <p:nvSpPr>
-          <p:cNvPr id="4" name="Slide Number Placeholder 3"/>
+          <p:cNvPr id="9" name="Slide Number Placeholder 8"/>
           <p:cNvSpPr>
             <a:spLocks noGrp="1"/>
           </p:cNvSpPr>
@@ -1874,7 +2405,7 @@
     </p:spTree>
     <p:extLst>
       <p:ext uri="{BB962C8B-B14F-4D97-AF65-F5344CB8AC3E}">
-        <p14:creationId xmlns:p14="http://schemas.microsoft.com/office/powerpoint/2010/main" val="691401857"/>
+        <p14:creationId xmlns:p14="http://schemas.microsoft.com/office/powerpoint/2010/main" val="230515474"/>
       </p:ext>
     </p:extLst>
   </p:cSld>
@@ -1885,7 +2416,7 @@
 </file>
 
 <file path=ppt/slideLayouts/slideLayout8.xml><?xml version="1.0" encoding="utf-8"?>
-<p:sldLayout xmlns:a="http://schemas.openxmlformats.org/drawingml/2006/main" xmlns:r="http://schemas.openxmlformats.org/officeDocument/2006/relationships" xmlns:p="http://schemas.openxmlformats.org/presentationml/2006/main" type="objTx" preserve="1">
+<p:sldLayout xmlns:a="http://schemas.openxmlformats.org/drawingml/2006/main" xmlns:r="http://schemas.openxmlformats.org/officeDocument/2006/relationships" xmlns:p="http://schemas.openxmlformats.org/presentationml/2006/main" showMasterSp="0" type="objTx" preserve="1">
   <p:cSld name="Content with Caption">
     <p:spTree>
       <p:nvGrpSpPr>
@@ -1903,25 +2434,107 @@
       </p:grpSpPr>
       <p:sp>
         <p:nvSpPr>
-          <p:cNvPr id="2" name="Title 1"/>
-          <p:cNvSpPr>
-            <a:spLocks noGrp="1"/>
-          </p:cNvSpPr>
-          <p:nvPr>
-            <p:ph type="title"/>
-          </p:nvPr>
+          <p:cNvPr id="8" name="Rectangle 7"/>
+          <p:cNvSpPr/>
+          <p:nvPr/>
         </p:nvSpPr>
         <p:spPr>
           <a:xfrm>
-            <a:off x="839788" y="457200"/>
-            <a:ext cx="3932237" cy="1600200"/>
+            <a:off x="16" y="0"/>
+            <a:ext cx="4050791" cy="6858000"/>
+          </a:xfrm>
+          <a:prstGeom prst="rect">
+            <a:avLst/>
+          </a:prstGeom>
+          <a:solidFill>
+            <a:schemeClr val="accent2"/>
+          </a:solidFill>
+          <a:ln>
+            <a:noFill/>
+          </a:ln>
+        </p:spPr>
+        <p:style>
+          <a:lnRef idx="2">
+            <a:schemeClr val="accent1">
+              <a:shade val="50000"/>
+            </a:schemeClr>
+          </a:lnRef>
+          <a:fillRef idx="1">
+            <a:schemeClr val="accent1"/>
+          </a:fillRef>
+          <a:effectRef idx="0">
+            <a:schemeClr val="accent1"/>
+          </a:effectRef>
+          <a:fontRef idx="minor">
+            <a:schemeClr val="lt1"/>
+          </a:fontRef>
+        </p:style>
+      </p:sp>
+      <p:sp>
+        <p:nvSpPr>
+          <p:cNvPr id="9" name="Rectangle 8"/>
+          <p:cNvSpPr/>
+          <p:nvPr/>
+        </p:nvSpPr>
+        <p:spPr>
+          <a:xfrm>
+            <a:off x="4040071" y="0"/>
+            <a:ext cx="64008" cy="6858000"/>
+          </a:xfrm>
+          <a:prstGeom prst="rect">
+            <a:avLst/>
+          </a:prstGeom>
+          <a:solidFill>
+            <a:schemeClr val="accent1"/>
+          </a:solidFill>
+          <a:ln>
+            <a:noFill/>
+          </a:ln>
+        </p:spPr>
+        <p:style>
+          <a:lnRef idx="2">
+            <a:schemeClr val="accent1">
+              <a:shade val="50000"/>
+            </a:schemeClr>
+          </a:lnRef>
+          <a:fillRef idx="1">
+            <a:schemeClr val="accent1"/>
+          </a:fillRef>
+          <a:effectRef idx="0">
+            <a:schemeClr val="accent1"/>
+          </a:effectRef>
+          <a:fontRef idx="minor">
+            <a:schemeClr val="lt1"/>
+          </a:fontRef>
+        </p:style>
+      </p:sp>
+      <p:sp>
+        <p:nvSpPr>
+          <p:cNvPr id="2" name="Title 1"/>
+          <p:cNvSpPr>
+            <a:spLocks noGrp="1"/>
+          </p:cNvSpPr>
+          <p:nvPr>
+            <p:ph type="title"/>
+          </p:nvPr>
+        </p:nvSpPr>
+        <p:spPr>
+          <a:xfrm>
+            <a:off x="457200" y="594359"/>
+            <a:ext cx="3200400" cy="2286000"/>
           </a:xfrm>
         </p:spPr>
         <p:txBody>
-          <a:bodyPr anchor="b"/>
+          <a:bodyPr anchor="b">
+            <a:normAutofit/>
+          </a:bodyPr>
           <a:lstStyle>
             <a:lvl1pPr>
-              <a:defRPr sz="3200"/>
+              <a:defRPr sz="3600" b="0">
+                <a:solidFill>
+                  <a:srgbClr val="FFFFFF"/>
+                </a:solidFill>
+              </a:defRPr>
             </a:lvl1pPr>
           </a:lstStyle>
           <a:p>
@@ -1929,7 +2542,7 @@
               <a:rPr lang="en-US" smtClean="0"/>
               <a:t>Click to edit Master title style</a:t>
             </a:r>
-            <a:endParaRPr lang="en-US"/>
+            <a:endParaRPr lang="en-US" dirty="0"/>
           </a:p>
         </p:txBody>
       </p:sp>
@@ -1945,39 +2558,111 @@
         </p:nvSpPr>
         <p:spPr>
           <a:xfrm>
-            <a:off x="5183188" y="987425"/>
-            <a:ext cx="6172200" cy="4873625"/>
+            <a:off x="4800600" y="731520"/>
+            <a:ext cx="6492240" cy="5257800"/>
           </a:xfrm>
         </p:spPr>
         <p:txBody>
           <a:bodyPr/>
+          <a:lstStyle/>
+          <a:p>
+            <a:pPr lvl="0"/>
+            <a:r>
+              <a:rPr lang="en-US" smtClean="0"/>
+              <a:t>Click to edit Master text styles</a:t>
+            </a:r>
+          </a:p>
+          <a:p>
+            <a:pPr lvl="1"/>
+            <a:r>
+              <a:rPr lang="en-US" smtClean="0"/>
+              <a:t>Second level</a:t>
+            </a:r>
+          </a:p>
+          <a:p>
+            <a:pPr lvl="2"/>
+            <a:r>
+              <a:rPr lang="en-US" smtClean="0"/>
+              <a:t>Third level</a:t>
+            </a:r>
+          </a:p>
+          <a:p>
+            <a:pPr lvl="3"/>
+            <a:r>
+              <a:rPr lang="en-US" smtClean="0"/>
+              <a:t>Fourth level</a:t>
+            </a:r>
+          </a:p>
+          <a:p>
+            <a:pPr lvl="4"/>
+            <a:r>
+              <a:rPr lang="en-US" smtClean="0"/>
+              <a:t>Fifth level</a:t>
+            </a:r>
+            <a:endParaRPr lang="en-US" dirty="0"/>
+          </a:p>
+        </p:txBody>
+      </p:sp>
+      <p:sp>
+        <p:nvSpPr>
+          <p:cNvPr id="4" name="Text Placeholder 3"/>
+          <p:cNvSpPr>
+            <a:spLocks noGrp="1"/>
+          </p:cNvSpPr>
+          <p:nvPr>
+            <p:ph type="body" sz="half" idx="2"/>
+          </p:nvPr>
+        </p:nvSpPr>
+        <p:spPr>
+          <a:xfrm>
+            <a:off x="457200" y="2926080"/>
+            <a:ext cx="3200400" cy="3379124"/>
+          </a:xfrm>
+        </p:spPr>
+        <p:txBody>
+          <a:bodyPr lIns="91440" rIns="91440">
+            <a:normAutofit/>
+          </a:bodyPr>
           <a:lstStyle>
-            <a:lvl1pPr>
-              <a:defRPr sz="3200"/>
+            <a:lvl1pPr marL="0" indent="0">
+              <a:buNone/>
+              <a:defRPr sz="1500">
+                <a:solidFill>
+                  <a:srgbClr val="FFFFFF"/>
+                </a:solidFill>
+              </a:defRPr>
             </a:lvl1pPr>
-            <a:lvl2pPr>
-              <a:defRPr sz="2800"/>
+            <a:lvl2pPr marL="457200" indent="0">
+              <a:buNone/>
+              <a:defRPr sz="1200"/>
             </a:lvl2pPr>
-            <a:lvl3pPr>
-              <a:defRPr sz="2400"/>
+            <a:lvl3pPr marL="914400" indent="0">
+              <a:buNone/>
+              <a:defRPr sz="1000"/>
             </a:lvl3pPr>
-            <a:lvl4pPr>
-              <a:defRPr sz="2000"/>
+            <a:lvl4pPr marL="1371600" indent="0">
+              <a:buNone/>
+              <a:defRPr sz="900"/>
             </a:lvl4pPr>
-            <a:lvl5pPr>
-              <a:defRPr sz="2000"/>
+            <a:lvl5pPr marL="1828800" indent="0">
+              <a:buNone/>
+              <a:defRPr sz="900"/>
             </a:lvl5pPr>
-            <a:lvl6pPr>
-              <a:defRPr sz="2000"/>
+            <a:lvl6pPr marL="2286000" indent="0">
+              <a:buNone/>
+              <a:defRPr sz="900"/>
             </a:lvl6pPr>
-            <a:lvl7pPr>
-              <a:defRPr sz="2000"/>
+            <a:lvl7pPr marL="2743200" indent="0">
+              <a:buNone/>
+              <a:defRPr sz="900"/>
             </a:lvl7pPr>
-            <a:lvl8pPr>
-              <a:defRPr sz="2000"/>
+            <a:lvl8pPr marL="3200400" indent="0">
+              <a:buNone/>
+              <a:defRPr sz="900"/>
             </a:lvl8pPr>
-            <a:lvl9pPr>
-              <a:defRPr sz="2000"/>
+            <a:lvl9pPr marL="3657600" indent="0">
+              <a:buNone/>
+              <a:defRPr sz="900"/>
             </a:lvl9pPr>
           </a:lstStyle>
           <a:p>
@@ -1987,116 +2672,31 @@
               <a:t>Click to edit Master text styles</a:t>
             </a:r>
           </a:p>
-          <a:p>
-            <a:pPr lvl="1"/>
-            <a:r>
-              <a:rPr lang="en-US" smtClean="0"/>
-              <a:t>Second level</a:t>
-            </a:r>
-          </a:p>
-          <a:p>
-            <a:pPr lvl="2"/>
-            <a:r>
-              <a:rPr lang="en-US" smtClean="0"/>
-              <a:t>Third level</a:t>
-            </a:r>
-          </a:p>
-          <a:p>
-            <a:pPr lvl="3"/>
-            <a:r>
-              <a:rPr lang="en-US" smtClean="0"/>
-              <a:t>Fourth level</a:t>
-            </a:r>
-          </a:p>
-          <a:p>
-            <a:pPr lvl="4"/>
-            <a:r>
-              <a:rPr lang="en-US" smtClean="0"/>
-              <a:t>Fifth level</a:t>
-            </a:r>
-            <a:endParaRPr lang="en-US"/>
-          </a:p>
-        </p:txBody>
-      </p:sp>
-      <p:sp>
-        <p:nvSpPr>
-          <p:cNvPr id="4" name="Text Placeholder 3"/>
-          <p:cNvSpPr>
-            <a:spLocks noGrp="1"/>
-          </p:cNvSpPr>
-          <p:nvPr>
-            <p:ph type="body" sz="half" idx="2"/>
+        </p:txBody>
+      </p:sp>
+      <p:sp>
+        <p:nvSpPr>
+          <p:cNvPr id="5" name="Date Placeholder 4"/>
+          <p:cNvSpPr>
+            <a:spLocks noGrp="1"/>
+          </p:cNvSpPr>
+          <p:nvPr>
+            <p:ph type="dt" sz="half" idx="10"/>
           </p:nvPr>
         </p:nvSpPr>
         <p:spPr>
           <a:xfrm>
-            <a:off x="839788" y="2057400"/>
-            <a:ext cx="3932237" cy="3811588"/>
+            <a:off x="465512" y="6459785"/>
+            <a:ext cx="2618510" cy="365125"/>
           </a:xfrm>
         </p:spPr>
         <p:txBody>
           <a:bodyPr/>
           <a:lstStyle>
-            <a:lvl1pPr marL="0" indent="0">
-              <a:buNone/>
-              <a:defRPr sz="1600"/>
+            <a:lvl1pPr algn="l">
+              <a:defRPr/>
             </a:lvl1pPr>
-            <a:lvl2pPr marL="457200" indent="0">
-              <a:buNone/>
-              <a:defRPr sz="1400"/>
-            </a:lvl2pPr>
-            <a:lvl3pPr marL="914400" indent="0">
-              <a:buNone/>
-              <a:defRPr sz="1200"/>
-            </a:lvl3pPr>
-            <a:lvl4pPr marL="1371600" indent="0">
-              <a:buNone/>
-              <a:defRPr sz="1000"/>
-            </a:lvl4pPr>
-            <a:lvl5pPr marL="1828800" indent="0">
-              <a:buNone/>
-              <a:defRPr sz="1000"/>
-            </a:lvl5pPr>
-            <a:lvl6pPr marL="2286000" indent="0">
-              <a:buNone/>
-              <a:defRPr sz="1000"/>
-            </a:lvl6pPr>
-            <a:lvl7pPr marL="2743200" indent="0">
-              <a:buNone/>
-              <a:defRPr sz="1000"/>
-            </a:lvl7pPr>
-            <a:lvl8pPr marL="3200400" indent="0">
-              <a:buNone/>
-              <a:defRPr sz="1000"/>
-            </a:lvl8pPr>
-            <a:lvl9pPr marL="3657600" indent="0">
-              <a:buNone/>
-              <a:defRPr sz="1000"/>
-            </a:lvl9pPr>
           </a:lstStyle>
-          <a:p>
-            <a:pPr lvl="0"/>
-            <a:r>
-              <a:rPr lang="en-US" smtClean="0"/>
-              <a:t>Click to edit Master text styles</a:t>
-            </a:r>
-          </a:p>
-        </p:txBody>
-      </p:sp>
-      <p:sp>
-        <p:nvSpPr>
-          <p:cNvPr id="5" name="Date Placeholder 4"/>
-          <p:cNvSpPr>
-            <a:spLocks noGrp="1"/>
-          </p:cNvSpPr>
-          <p:nvPr>
-            <p:ph type="dt" sz="half" idx="10"/>
-          </p:nvPr>
-        </p:nvSpPr>
-        <p:spPr/>
-        <p:txBody>
-          <a:bodyPr/>
-          <a:lstStyle/>
           <a:p>
             <a:fld id="{1F165865-96FB-624C-9526-1425394199E4}" type="datetimeFigureOut">
               <a:rPr lang="en-US" smtClean="0"/>
@@ -2116,29 +2716,50 @@
             <p:ph type="ftr" sz="quarter" idx="11"/>
           </p:nvPr>
         </p:nvSpPr>
+        <p:spPr>
+          <a:xfrm>
+            <a:off x="4800600" y="6459785"/>
+            <a:ext cx="4648200" cy="365125"/>
+          </a:xfrm>
+        </p:spPr>
+        <p:txBody>
+          <a:bodyPr/>
+          <a:lstStyle>
+            <a:lvl1pPr algn="l">
+              <a:defRPr>
+                <a:solidFill>
+                  <a:schemeClr val="tx2"/>
+                </a:solidFill>
+              </a:defRPr>
+            </a:lvl1pPr>
+          </a:lstStyle>
+          <a:p>
+            <a:endParaRPr lang="en-US"/>
+          </a:p>
+        </p:txBody>
+      </p:sp>
+      <p:sp>
+        <p:nvSpPr>
+          <p:cNvPr id="7" name="Slide Number Placeholder 6"/>
+          <p:cNvSpPr>
+            <a:spLocks noGrp="1"/>
+          </p:cNvSpPr>
+          <p:nvPr>
+            <p:ph type="sldNum" sz="quarter" idx="12"/>
+          </p:nvPr>
+        </p:nvSpPr>
         <p:spPr/>
         <p:txBody>
           <a:bodyPr/>
-          <a:lstStyle/>
-          <a:p>
-            <a:endParaRPr lang="en-US"/>
-          </a:p>
-        </p:txBody>
-      </p:sp>
-      <p:sp>
-        <p:nvSpPr>
-          <p:cNvPr id="7" name="Slide Number Placeholder 6"/>
-          <p:cNvSpPr>
-            <a:spLocks noGrp="1"/>
-          </p:cNvSpPr>
-          <p:nvPr>
-            <p:ph type="sldNum" sz="quarter" idx="12"/>
-          </p:nvPr>
-        </p:nvSpPr>
-        <p:spPr/>
-        <p:txBody>
-          <a:bodyPr/>
-          <a:lstStyle/>
+          <a:lstStyle>
+            <a:lvl1pPr>
+              <a:defRPr>
+                <a:solidFill>
+                  <a:schemeClr val="tx2"/>
+                </a:solidFill>
+              </a:defRPr>
+            </a:lvl1pPr>
+          </a:lstStyle>
           <a:p>
             <a:fld id="{EA6C7220-4F2E-B642-A4BE-A4CA24B99FD1}" type="slidenum">
               <a:rPr lang="en-US" smtClean="0"/>
@@ -2151,7 +2772,7 @@
     </p:spTree>
     <p:extLst>
       <p:ext uri="{BB962C8B-B14F-4D97-AF65-F5344CB8AC3E}">
-        <p14:creationId xmlns:p14="http://schemas.microsoft.com/office/powerpoint/2010/main" val="356996682"/>
+        <p14:creationId xmlns:p14="http://schemas.microsoft.com/office/powerpoint/2010/main" val="213072330"/>
       </p:ext>
     </p:extLst>
   </p:cSld>
@@ -2162,7 +2783,7 @@
 </file>
 
 <file path=ppt/slideLayouts/slideLayout9.xml><?xml version="1.0" encoding="utf-8"?>
-<p:sldLayout xmlns:a="http://schemas.openxmlformats.org/drawingml/2006/main" xmlns:r="http://schemas.openxmlformats.org/officeDocument/2006/relationships" xmlns:p="http://schemas.openxmlformats.org/presentationml/2006/main" type="picTx" preserve="1">
+<p:sldLayout xmlns:a="http://schemas.openxmlformats.org/drawingml/2006/main" xmlns:r="http://schemas.openxmlformats.org/officeDocument/2006/relationships" xmlns:p="http://schemas.openxmlformats.org/presentationml/2006/main" showMasterSp="0" type="picTx" preserve="1">
   <p:cSld name="Picture with Caption">
     <p:spTree>
       <p:nvGrpSpPr>
@@ -2180,25 +2801,107 @@
       </p:grpSpPr>
       <p:sp>
         <p:nvSpPr>
-          <p:cNvPr id="2" name="Title 1"/>
-          <p:cNvSpPr>
-            <a:spLocks noGrp="1"/>
-          </p:cNvSpPr>
-          <p:nvPr>
-            <p:ph type="title"/>
-          </p:nvPr>
+          <p:cNvPr id="8" name="Rectangle 7"/>
+          <p:cNvSpPr/>
+          <p:nvPr/>
         </p:nvSpPr>
         <p:spPr>
           <a:xfrm>
-            <a:off x="839788" y="457200"/>
-            <a:ext cx="3932237" cy="1600200"/>
+            <a:off x="0" y="4953000"/>
+            <a:ext cx="12188825" cy="1905000"/>
+          </a:xfrm>
+          <a:prstGeom prst="rect">
+            <a:avLst/>
+          </a:prstGeom>
+          <a:solidFill>
+            <a:schemeClr val="accent2"/>
+          </a:solidFill>
+          <a:ln>
+            <a:noFill/>
+          </a:ln>
+        </p:spPr>
+        <p:style>
+          <a:lnRef idx="2">
+            <a:schemeClr val="accent1">
+              <a:shade val="50000"/>
+            </a:schemeClr>
+          </a:lnRef>
+          <a:fillRef idx="1">
+            <a:schemeClr val="accent1"/>
+          </a:fillRef>
+          <a:effectRef idx="0">
+            <a:schemeClr val="accent1"/>
+          </a:effectRef>
+          <a:fontRef idx="minor">
+            <a:schemeClr val="lt1"/>
+          </a:fontRef>
+        </p:style>
+      </p:sp>
+      <p:sp>
+        <p:nvSpPr>
+          <p:cNvPr id="9" name="Rectangle 8"/>
+          <p:cNvSpPr/>
+          <p:nvPr/>
+        </p:nvSpPr>
+        <p:spPr>
+          <a:xfrm>
+            <a:off x="15" y="4915076"/>
+            <a:ext cx="12188825" cy="64008"/>
+          </a:xfrm>
+          <a:prstGeom prst="rect">
+            <a:avLst/>
+          </a:prstGeom>
+          <a:solidFill>
+            <a:schemeClr val="accent1"/>
+          </a:solidFill>
+          <a:ln>
+            <a:noFill/>
+          </a:ln>
+        </p:spPr>
+        <p:style>
+          <a:lnRef idx="2">
+            <a:schemeClr val="accent1">
+              <a:shade val="50000"/>
+            </a:schemeClr>
+          </a:lnRef>
+          <a:fillRef idx="1">
+            <a:schemeClr val="accent1"/>
+          </a:fillRef>
+          <a:effectRef idx="0">
+            <a:schemeClr val="accent1"/>
+          </a:effectRef>
+          <a:fontRef idx="minor">
+            <a:schemeClr val="lt1"/>
+          </a:fontRef>
+        </p:style>
+      </p:sp>
+      <p:sp>
+        <p:nvSpPr>
+          <p:cNvPr id="2" name="Title 1"/>
+          <p:cNvSpPr>
+            <a:spLocks noGrp="1"/>
+          </p:cNvSpPr>
+          <p:nvPr>
+            <p:ph type="title"/>
+          </p:nvPr>
+        </p:nvSpPr>
+        <p:spPr>
+          <a:xfrm>
+            <a:off x="1097280" y="5074920"/>
+            <a:ext cx="10113264" cy="822960"/>
           </a:xfrm>
         </p:spPr>
         <p:txBody>
-          <a:bodyPr anchor="b"/>
+          <a:bodyPr lIns="91440" tIns="0" rIns="91440" bIns="0" anchor="b">
+            <a:noAutofit/>
+          </a:bodyPr>
           <a:lstStyle>
             <a:lvl1pPr>
-              <a:defRPr sz="3200"/>
+              <a:defRPr sz="3600" b="0">
+                <a:solidFill>
+                  <a:srgbClr val="FFFFFF"/>
+                </a:solidFill>
+              </a:defRPr>
             </a:lvl1pPr>
           </a:lstStyle>
           <a:p>
@@ -2206,7 +2909,7 @@
               <a:rPr lang="en-US" smtClean="0"/>
               <a:t>Click to edit Master title style</a:t>
             </a:r>
-            <a:endParaRPr lang="en-US"/>
+            <a:endParaRPr lang="en-US" dirty="0"/>
           </a:p>
         </p:txBody>
       </p:sp>
@@ -2214,7 +2917,7 @@
         <p:nvSpPr>
           <p:cNvPr id="3" name="Picture Placeholder 2"/>
           <p:cNvSpPr>
-            <a:spLocks noGrp="1"/>
+            <a:spLocks noGrp="1" noChangeAspect="1"/>
           </p:cNvSpPr>
           <p:nvPr>
             <p:ph type="pic" idx="1"/>
@@ -2222,16 +2925,26 @@
         </p:nvSpPr>
         <p:spPr>
           <a:xfrm>
-            <a:off x="5183188" y="987425"/>
-            <a:ext cx="6172200" cy="4873625"/>
+            <a:off x="15" y="0"/>
+            <a:ext cx="12191985" cy="4915076"/>
           </a:xfrm>
+          <a:blipFill>
+            <a:blip r:embed="rId2"/>
+            <a:stretch>
+              <a:fillRect/>
+            </a:stretch>
+          </a:blipFill>
         </p:spPr>
         <p:txBody>
-          <a:bodyPr/>
+          <a:bodyPr lIns="457200" tIns="457200" anchor="t"/>
           <a:lstStyle>
             <a:lvl1pPr marL="0" indent="0">
               <a:buNone/>
-              <a:defRPr sz="3200"/>
+              <a:defRPr sz="3200">
+                <a:solidFill>
+                  <a:schemeClr val="bg1"/>
+                </a:solidFill>
+              </a:defRPr>
             </a:lvl1pPr>
             <a:lvl2pPr marL="457200" indent="0">
               <a:buNone/>
@@ -2267,7 +2980,11 @@
             </a:lvl9pPr>
           </a:lstStyle>
           <a:p>
-            <a:endParaRPr lang="en-US"/>
+            <a:r>
+              <a:rPr lang="en-US" smtClean="0"/>
+              <a:t>Drag picture to placeholder or click icon to add</a:t>
+            </a:r>
+            <a:endParaRPr lang="en-US" dirty="0"/>
           </a:p>
         </p:txBody>
       </p:sp>
@@ -2283,48 +3000,60 @@
         </p:nvSpPr>
         <p:spPr>
           <a:xfrm>
-            <a:off x="839788" y="2057400"/>
-            <a:ext cx="3932237" cy="3811588"/>
+            <a:off x="1097280" y="5907023"/>
+            <a:ext cx="10113264" cy="594360"/>
           </a:xfrm>
         </p:spPr>
         <p:txBody>
-          <a:bodyPr/>
+          <a:bodyPr lIns="91440" tIns="0" rIns="91440" bIns="0">
+            <a:normAutofit/>
+          </a:bodyPr>
           <a:lstStyle>
             <a:lvl1pPr marL="0" indent="0">
-              <a:buNone/>
-              <a:defRPr sz="1600"/>
+              <a:spcBef>
+                <a:spcPts val="0"/>
+              </a:spcBef>
+              <a:spcAft>
+                <a:spcPts val="600"/>
+              </a:spcAft>
+              <a:buNone/>
+              <a:defRPr sz="1500">
+                <a:solidFill>
+                  <a:srgbClr val="FFFFFF"/>
+                </a:solidFill>
+              </a:defRPr>
             </a:lvl1pPr>
             <a:lvl2pPr marL="457200" indent="0">
               <a:buNone/>
-              <a:defRPr sz="1400"/>
+              <a:defRPr sz="1200"/>
             </a:lvl2pPr>
             <a:lvl3pPr marL="914400" indent="0">
               <a:buNone/>
-              <a:defRPr sz="1200"/>
+              <a:defRPr sz="1000"/>
             </a:lvl3pPr>
             <a:lvl4pPr marL="1371600" indent="0">
               <a:buNone/>
-              <a:defRPr sz="1000"/>
+              <a:defRPr sz="900"/>
             </a:lvl4pPr>
             <a:lvl5pPr marL="1828800" indent="0">
               <a:buNone/>
-              <a:defRPr sz="1000"/>
+              <a:defRPr sz="900"/>
             </a:lvl5pPr>
             <a:lvl6pPr marL="2286000" indent="0">
               <a:buNone/>
-              <a:defRPr sz="1000"/>
+              <a:defRPr sz="900"/>
             </a:lvl6pPr>
             <a:lvl7pPr marL="2743200" indent="0">
               <a:buNone/>
-              <a:defRPr sz="1000"/>
+              <a:defRPr sz="900"/>
             </a:lvl7pPr>
             <a:lvl8pPr marL="3200400" indent="0">
               <a:buNone/>
-              <a:defRPr sz="1000"/>
+              <a:defRPr sz="900"/>
             </a:lvl8pPr>
             <a:lvl9pPr marL="3657600" indent="0">
               <a:buNone/>
-              <a:defRPr sz="1000"/>
+              <a:defRPr sz="900"/>
             </a:lvl9pPr>
           </a:lstStyle>
           <a:p>
@@ -2404,7 +3133,7 @@
     </p:spTree>
     <p:extLst>
       <p:ext uri="{BB962C8B-B14F-4D97-AF65-F5344CB8AC3E}">
-        <p14:creationId xmlns:p14="http://schemas.microsoft.com/office/powerpoint/2010/main" val="2121408303"/>
+        <p14:creationId xmlns:p14="http://schemas.microsoft.com/office/powerpoint/2010/main" val="1251410761"/>
       </p:ext>
     </p:extLst>
   </p:cSld>
@@ -2438,25 +3167,101 @@
       </p:grpSpPr>
       <p:sp>
         <p:nvSpPr>
-          <p:cNvPr id="2" name="Title Placeholder 1"/>
-          <p:cNvSpPr>
-            <a:spLocks noGrp="1"/>
-          </p:cNvSpPr>
-          <p:nvPr>
-            <p:ph type="title"/>
-          </p:nvPr>
+          <p:cNvPr id="7" name="Rectangle 6"/>
+          <p:cNvSpPr/>
+          <p:nvPr/>
         </p:nvSpPr>
         <p:spPr>
           <a:xfrm>
-            <a:off x="838200" y="365125"/>
-            <a:ext cx="10515600" cy="1325563"/>
+            <a:off x="1" y="6400800"/>
+            <a:ext cx="12192000" cy="457200"/>
+          </a:xfrm>
+          <a:prstGeom prst="rect">
+            <a:avLst/>
+          </a:prstGeom>
+          <a:solidFill>
+            <a:schemeClr val="accent2"/>
+          </a:solidFill>
+          <a:ln>
+            <a:noFill/>
+          </a:ln>
+        </p:spPr>
+        <p:style>
+          <a:lnRef idx="2">
+            <a:schemeClr val="accent1">
+              <a:shade val="50000"/>
+            </a:schemeClr>
+          </a:lnRef>
+          <a:fillRef idx="1">
+            <a:schemeClr val="accent1"/>
+          </a:fillRef>
+          <a:effectRef idx="0">
+            <a:schemeClr val="accent1"/>
+          </a:effectRef>
+          <a:fontRef idx="minor">
+            <a:schemeClr val="lt1"/>
+          </a:fontRef>
+        </p:style>
+      </p:sp>
+      <p:sp>
+        <p:nvSpPr>
+          <p:cNvPr id="9" name="Rectangle 8"/>
+          <p:cNvSpPr/>
+          <p:nvPr/>
+        </p:nvSpPr>
+        <p:spPr>
+          <a:xfrm>
+            <a:off x="0" y="6334316"/>
+            <a:ext cx="12192001" cy="65998"/>
+          </a:xfrm>
+          <a:prstGeom prst="rect">
+            <a:avLst/>
+          </a:prstGeom>
+          <a:solidFill>
+            <a:schemeClr val="accent1"/>
+          </a:solidFill>
+          <a:ln>
+            <a:noFill/>
+          </a:ln>
+        </p:spPr>
+        <p:style>
+          <a:lnRef idx="2">
+            <a:schemeClr val="accent1">
+              <a:shade val="50000"/>
+            </a:schemeClr>
+          </a:lnRef>
+          <a:fillRef idx="1">
+            <a:schemeClr val="accent1"/>
+          </a:fillRef>
+          <a:effectRef idx="0">
+            <a:schemeClr val="accent1"/>
+          </a:effectRef>
+          <a:fontRef idx="minor">
+            <a:schemeClr val="lt1"/>
+          </a:fontRef>
+        </p:style>
+      </p:sp>
+      <p:sp>
+        <p:nvSpPr>
+          <p:cNvPr id="2" name="Title Placeholder 1"/>
+          <p:cNvSpPr>
+            <a:spLocks noGrp="1"/>
+          </p:cNvSpPr>
+          <p:nvPr>
+            <p:ph type="title"/>
+          </p:nvPr>
+        </p:nvSpPr>
+        <p:spPr>
+          <a:xfrm>
+            <a:off x="1097280" y="286603"/>
+            <a:ext cx="10058400" cy="1450757"/>
           </a:xfrm>
           <a:prstGeom prst="rect">
             <a:avLst/>
           </a:prstGeom>
         </p:spPr>
         <p:txBody>
-          <a:bodyPr vert="horz" lIns="91440" tIns="45720" rIns="91440" bIns="45720" rtlCol="0" anchor="ctr">
+          <a:bodyPr vert="horz" lIns="91440" tIns="45720" rIns="91440" bIns="45720" rtlCol="0" anchor="b">
             <a:normAutofit/>
           </a:bodyPr>
           <a:lstStyle/>
@@ -2465,7 +3270,7 @@
               <a:rPr lang="en-US" smtClean="0"/>
               <a:t>Click to edit Master title style</a:t>
             </a:r>
-            <a:endParaRPr lang="en-US"/>
+            <a:endParaRPr lang="en-US" dirty="0"/>
           </a:p>
         </p:txBody>
       </p:sp>
@@ -2481,15 +3286,15 @@
         </p:nvSpPr>
         <p:spPr>
           <a:xfrm>
-            <a:off x="838200" y="1825625"/>
-            <a:ext cx="10515600" cy="4351338"/>
+            <a:off x="1097280" y="1845734"/>
+            <a:ext cx="10058400" cy="4023360"/>
           </a:xfrm>
           <a:prstGeom prst="rect">
             <a:avLst/>
           </a:prstGeom>
         </p:spPr>
         <p:txBody>
-          <a:bodyPr vert="horz" lIns="91440" tIns="45720" rIns="91440" bIns="45720" rtlCol="0">
+          <a:bodyPr vert="horz" lIns="0" tIns="45720" rIns="0" bIns="45720" rtlCol="0">
             <a:normAutofit/>
           </a:bodyPr>
           <a:lstStyle/>
@@ -2527,7 +3332,7 @@
               <a:rPr lang="en-US" smtClean="0"/>
               <a:t>Fifth level</a:t>
             </a:r>
-            <a:endParaRPr lang="en-US"/>
+            <a:endParaRPr lang="en-US" dirty="0"/>
           </a:p>
         </p:txBody>
       </p:sp>
@@ -2543,8 +3348,8 @@
         </p:nvSpPr>
         <p:spPr>
           <a:xfrm>
-            <a:off x="838200" y="6356350"/>
-            <a:ext cx="2743200" cy="365125"/>
+            <a:off x="1097280" y="6459785"/>
+            <a:ext cx="2472271" cy="365125"/>
           </a:xfrm>
           <a:prstGeom prst="rect">
             <a:avLst/>
@@ -2554,11 +3359,9 @@
           <a:bodyPr vert="horz" lIns="91440" tIns="45720" rIns="91440" bIns="45720" rtlCol="0" anchor="ctr"/>
           <a:lstStyle>
             <a:lvl1pPr algn="l">
-              <a:defRPr sz="1200">
+              <a:defRPr sz="900">
                 <a:solidFill>
-                  <a:schemeClr val="tx1">
-                    <a:tint val="75000"/>
-                  </a:schemeClr>
+                  <a:srgbClr val="FFFFFF"/>
                 </a:solidFill>
               </a:defRPr>
             </a:lvl1pPr>
@@ -2584,8 +3387,8 @@
         </p:nvSpPr>
         <p:spPr>
           <a:xfrm>
-            <a:off x="4038600" y="6356350"/>
-            <a:ext cx="4114800" cy="365125"/>
+            <a:off x="3686185" y="6459785"/>
+            <a:ext cx="4822804" cy="365125"/>
           </a:xfrm>
           <a:prstGeom prst="rect">
             <a:avLst/>
@@ -2595,11 +3398,9 @@
           <a:bodyPr vert="horz" lIns="91440" tIns="45720" rIns="91440" bIns="45720" rtlCol="0" anchor="ctr"/>
           <a:lstStyle>
             <a:lvl1pPr algn="ctr">
-              <a:defRPr sz="1200">
+              <a:defRPr sz="900" cap="all" baseline="0">
                 <a:solidFill>
-                  <a:schemeClr val="tx1">
-                    <a:tint val="75000"/>
-                  </a:schemeClr>
+                  <a:srgbClr val="FFFFFF"/>
                 </a:solidFill>
               </a:defRPr>
             </a:lvl1pPr>
@@ -2621,8 +3422,8 @@
         </p:nvSpPr>
         <p:spPr>
           <a:xfrm>
-            <a:off x="8610600" y="6356350"/>
-            <a:ext cx="2743200" cy="365125"/>
+            <a:off x="9900458" y="6459785"/>
+            <a:ext cx="1312025" cy="365125"/>
           </a:xfrm>
           <a:prstGeom prst="rect">
             <a:avLst/>
@@ -2632,11 +3433,9 @@
           <a:bodyPr vert="horz" lIns="91440" tIns="45720" rIns="91440" bIns="45720" rtlCol="0" anchor="ctr"/>
           <a:lstStyle>
             <a:lvl1pPr algn="r">
-              <a:defRPr sz="1200">
+              <a:defRPr sz="1050">
                 <a:solidFill>
-                  <a:schemeClr val="tx1">
-                    <a:tint val="75000"/>
-                  </a:schemeClr>
+                  <a:srgbClr val="FFFFFF"/>
                 </a:solidFill>
               </a:defRPr>
             </a:lvl1pPr>
@@ -2650,40 +3449,81 @@
           </a:p>
         </p:txBody>
       </p:sp>
+      <p:cxnSp>
+        <p:nvCxnSpPr>
+          <p:cNvPr id="10" name="Straight Connector 9"/>
+          <p:cNvCxnSpPr/>
+          <p:nvPr/>
+        </p:nvCxnSpPr>
+        <p:spPr>
+          <a:xfrm>
+            <a:off x="1193532" y="1737845"/>
+            <a:ext cx="9966960" cy="0"/>
+          </a:xfrm>
+          <a:prstGeom prst="line">
+            <a:avLst/>
+          </a:prstGeom>
+          <a:ln w="6350">
+            <a:solidFill>
+              <a:schemeClr val="tx1">
+                <a:lumMod val="50000"/>
+                <a:lumOff val="50000"/>
+              </a:schemeClr>
+            </a:solidFill>
+          </a:ln>
+        </p:spPr>
+        <p:style>
+          <a:lnRef idx="1">
+            <a:schemeClr val="accent1"/>
+          </a:lnRef>
+          <a:fillRef idx="0">
+            <a:schemeClr val="accent1"/>
+          </a:fillRef>
+          <a:effectRef idx="0">
+            <a:schemeClr val="accent1"/>
+          </a:effectRef>
+          <a:fontRef idx="minor">
+            <a:schemeClr val="tx1"/>
+          </a:fontRef>
+        </p:style>
+      </p:cxnSp>
     </p:spTree>
     <p:extLst>
       <p:ext uri="{BB962C8B-B14F-4D97-AF65-F5344CB8AC3E}">
-        <p14:creationId xmlns:p14="http://schemas.microsoft.com/office/powerpoint/2010/main" val="608905580"/>
+        <p14:creationId xmlns:p14="http://schemas.microsoft.com/office/powerpoint/2010/main" val="245703484"/>
       </p:ext>
     </p:extLst>
   </p:cSld>
   <p:clrMap bg1="lt1" tx1="dk1" bg2="lt2" tx2="dk2" accent1="accent1" accent2="accent2" accent3="accent3" accent4="accent4" accent5="accent5" accent6="accent6" hlink="hlink" folHlink="folHlink"/>
   <p:sldLayoutIdLst>
-    <p:sldLayoutId id="2147483673" r:id="rId1"/>
-    <p:sldLayoutId id="2147483674" r:id="rId2"/>
-    <p:sldLayoutId id="2147483675" r:id="rId3"/>
-    <p:sldLayoutId id="2147483676" r:id="rId4"/>
-    <p:sldLayoutId id="2147483677" r:id="rId5"/>
-    <p:sldLayoutId id="2147483678" r:id="rId6"/>
-    <p:sldLayoutId id="2147483679" r:id="rId7"/>
-    <p:sldLayoutId id="2147483680" r:id="rId8"/>
-    <p:sldLayoutId id="2147483681" r:id="rId9"/>
-    <p:sldLayoutId id="2147483682" r:id="rId10"/>
-    <p:sldLayoutId id="2147483683" r:id="rId11"/>
+    <p:sldLayoutId id="2147483685" r:id="rId1"/>
+    <p:sldLayoutId id="2147483686" r:id="rId2"/>
+    <p:sldLayoutId id="2147483687" r:id="rId3"/>
+    <p:sldLayoutId id="2147483688" r:id="rId4"/>
+    <p:sldLayoutId id="2147483689" r:id="rId5"/>
+    <p:sldLayoutId id="2147483690" r:id="rId6"/>
+    <p:sldLayoutId id="2147483691" r:id="rId7"/>
+    <p:sldLayoutId id="2147483692" r:id="rId8"/>
+    <p:sldLayoutId id="2147483693" r:id="rId9"/>
+    <p:sldLayoutId id="2147483694" r:id="rId10"/>
+    <p:sldLayoutId id="2147483695" r:id="rId11"/>
   </p:sldLayoutIdLst>
   <p:txStyles>
     <p:titleStyle>
       <a:lvl1pPr algn="l" defTabSz="914400" rtl="0" eaLnBrk="1" latinLnBrk="0" hangingPunct="1">
         <a:lnSpc>
-          <a:spcPct val="90000"/>
+          <a:spcPct val="85000"/>
         </a:lnSpc>
         <a:spcBef>
           <a:spcPct val="0"/>
         </a:spcBef>
         <a:buNone/>
-        <a:defRPr sz="4400" kern="1200">
+        <a:defRPr sz="4800" kern="1200" spc="-50" baseline="0">
           <a:solidFill>
-            <a:schemeClr val="tx1"/>
+            <a:schemeClr val="tx1">
+              <a:lumMod val="75000"/>
+              <a:lumOff val="25000"/>
+            </a:schemeClr>
           </a:solidFill>
           <a:latin typeface="+mj-lt"/>
           <a:ea typeface="+mj-ea"/>
@@ -2692,162 +3532,244 @@
       </a:lvl1pPr>
     </p:titleStyle>
     <p:bodyStyle>
-      <a:lvl1pPr marL="228600" indent="-228600" algn="l" defTabSz="914400" rtl="0" eaLnBrk="1" latinLnBrk="0" hangingPunct="1">
+      <a:lvl1pPr marL="91440" indent="-91440" algn="l" defTabSz="914400" rtl="0" eaLnBrk="1" latinLnBrk="0" hangingPunct="1">
         <a:lnSpc>
           <a:spcPct val="90000"/>
         </a:lnSpc>
         <a:spcBef>
-          <a:spcPts val="1000"/>
+          <a:spcPts val="1200"/>
         </a:spcBef>
-        <a:buFont typeface="Arial"/>
-        <a:buChar char="•"/>
-        <a:defRPr sz="2800" kern="1200">
+        <a:spcAft>
+          <a:spcPts val="200"/>
+        </a:spcAft>
+        <a:buClr>
+          <a:schemeClr val="accent1"/>
+        </a:buClr>
+        <a:buSzPct val="100000"/>
+        <a:buFont typeface="Calibri" panose="020F0502020204030204" pitchFamily="34" charset="0"/>
+        <a:buChar char=" "/>
+        <a:defRPr sz="2000" kern="1200">
           <a:solidFill>
-            <a:schemeClr val="tx1"/>
+            <a:schemeClr val="tx1">
+              <a:lumMod val="75000"/>
+              <a:lumOff val="25000"/>
+            </a:schemeClr>
           </a:solidFill>
           <a:latin typeface="+mn-lt"/>
           <a:ea typeface="+mn-ea"/>
           <a:cs typeface="+mn-cs"/>
         </a:defRPr>
       </a:lvl1pPr>
-      <a:lvl2pPr marL="685800" indent="-228600" algn="l" defTabSz="914400" rtl="0" eaLnBrk="1" latinLnBrk="0" hangingPunct="1">
+      <a:lvl2pPr marL="384048" indent="-182880" algn="l" defTabSz="914400" rtl="0" eaLnBrk="1" latinLnBrk="0" hangingPunct="1">
         <a:lnSpc>
           <a:spcPct val="90000"/>
         </a:lnSpc>
         <a:spcBef>
-          <a:spcPts val="500"/>
+          <a:spcPts val="200"/>
         </a:spcBef>
-        <a:buFont typeface="Arial"/>
-        <a:buChar char="•"/>
-        <a:defRPr sz="2400" kern="1200">
+        <a:spcAft>
+          <a:spcPts val="400"/>
+        </a:spcAft>
+        <a:buClr>
+          <a:schemeClr val="accent1"/>
+        </a:buClr>
+        <a:buFont typeface="Calibri" pitchFamily="34" charset="0"/>
+        <a:buChar char="◦"/>
+        <a:defRPr sz="1800" kern="1200">
           <a:solidFill>
-            <a:schemeClr val="tx1"/>
+            <a:schemeClr val="tx1">
+              <a:lumMod val="75000"/>
+              <a:lumOff val="25000"/>
+            </a:schemeClr>
           </a:solidFill>
           <a:latin typeface="+mn-lt"/>
           <a:ea typeface="+mn-ea"/>
           <a:cs typeface="+mn-cs"/>
         </a:defRPr>
       </a:lvl2pPr>
-      <a:lvl3pPr marL="1143000" indent="-228600" algn="l" defTabSz="914400" rtl="0" eaLnBrk="1" latinLnBrk="0" hangingPunct="1">
+      <a:lvl3pPr marL="566928" indent="-182880" algn="l" defTabSz="914400" rtl="0" eaLnBrk="1" latinLnBrk="0" hangingPunct="1">
         <a:lnSpc>
           <a:spcPct val="90000"/>
         </a:lnSpc>
         <a:spcBef>
-          <a:spcPts val="500"/>
+          <a:spcPts val="200"/>
         </a:spcBef>
-        <a:buFont typeface="Arial"/>
-        <a:buChar char="•"/>
-        <a:defRPr sz="2000" kern="1200">
+        <a:spcAft>
+          <a:spcPts val="400"/>
+        </a:spcAft>
+        <a:buClr>
+          <a:schemeClr val="accent1"/>
+        </a:buClr>
+        <a:buFont typeface="Calibri" pitchFamily="34" charset="0"/>
+        <a:buChar char="◦"/>
+        <a:defRPr sz="1400" kern="1200">
           <a:solidFill>
-            <a:schemeClr val="tx1"/>
+            <a:schemeClr val="tx1">
+              <a:lumMod val="75000"/>
+              <a:lumOff val="25000"/>
+            </a:schemeClr>
           </a:solidFill>
           <a:latin typeface="+mn-lt"/>
           <a:ea typeface="+mn-ea"/>
           <a:cs typeface="+mn-cs"/>
         </a:defRPr>
       </a:lvl3pPr>
-      <a:lvl4pPr marL="1600200" indent="-228600" algn="l" defTabSz="914400" rtl="0" eaLnBrk="1" latinLnBrk="0" hangingPunct="1">
+      <a:lvl4pPr marL="749808" indent="-182880" algn="l" defTabSz="914400" rtl="0" eaLnBrk="1" latinLnBrk="0" hangingPunct="1">
         <a:lnSpc>
           <a:spcPct val="90000"/>
         </a:lnSpc>
         <a:spcBef>
-          <a:spcPts val="500"/>
+          <a:spcPts val="200"/>
         </a:spcBef>
-        <a:buFont typeface="Arial"/>
-        <a:buChar char="•"/>
-        <a:defRPr sz="1800" kern="1200">
+        <a:spcAft>
+          <a:spcPts val="400"/>
+        </a:spcAft>
+        <a:buClr>
+          <a:schemeClr val="accent1"/>
+        </a:buClr>
+        <a:buFont typeface="Calibri" pitchFamily="34" charset="0"/>
+        <a:buChar char="◦"/>
+        <a:defRPr sz="1400" kern="1200">
           <a:solidFill>
-            <a:schemeClr val="tx1"/>
+            <a:schemeClr val="tx1">
+              <a:lumMod val="75000"/>
+              <a:lumOff val="25000"/>
+            </a:schemeClr>
           </a:solidFill>
           <a:latin typeface="+mn-lt"/>
           <a:ea typeface="+mn-ea"/>
           <a:cs typeface="+mn-cs"/>
         </a:defRPr>
       </a:lvl4pPr>
-      <a:lvl5pPr marL="2057400" indent="-228600" algn="l" defTabSz="914400" rtl="0" eaLnBrk="1" latinLnBrk="0" hangingPunct="1">
+      <a:lvl5pPr marL="932688" indent="-182880" algn="l" defTabSz="914400" rtl="0" eaLnBrk="1" latinLnBrk="0" hangingPunct="1">
         <a:lnSpc>
           <a:spcPct val="90000"/>
         </a:lnSpc>
         <a:spcBef>
-          <a:spcPts val="500"/>
+          <a:spcPts val="200"/>
         </a:spcBef>
-        <a:buFont typeface="Arial"/>
-        <a:buChar char="•"/>
-        <a:defRPr sz="1800" kern="1200">
+        <a:spcAft>
+          <a:spcPts val="400"/>
+        </a:spcAft>
+        <a:buClr>
+          <a:schemeClr val="accent1"/>
+        </a:buClr>
+        <a:buFont typeface="Calibri" pitchFamily="34" charset="0"/>
+        <a:buChar char="◦"/>
+        <a:defRPr sz="1400" kern="1200">
           <a:solidFill>
-            <a:schemeClr val="tx1"/>
+            <a:schemeClr val="tx1">
+              <a:lumMod val="75000"/>
+              <a:lumOff val="25000"/>
+            </a:schemeClr>
           </a:solidFill>
           <a:latin typeface="+mn-lt"/>
           <a:ea typeface="+mn-ea"/>
           <a:cs typeface="+mn-cs"/>
         </a:defRPr>
       </a:lvl5pPr>
-      <a:lvl6pPr marL="2514600" indent="-228600" algn="l" defTabSz="914400" rtl="0" eaLnBrk="1" latinLnBrk="0" hangingPunct="1">
+      <a:lvl6pPr marL="1100000" indent="-228600" algn="l" defTabSz="914400" rtl="0" eaLnBrk="1" latinLnBrk="0" hangingPunct="1">
         <a:lnSpc>
           <a:spcPct val="90000"/>
         </a:lnSpc>
         <a:spcBef>
-          <a:spcPts val="500"/>
+          <a:spcPts val="200"/>
         </a:spcBef>
-        <a:buFont typeface="Arial"/>
-        <a:buChar char="•"/>
-        <a:defRPr sz="1800" kern="1200">
+        <a:spcAft>
+          <a:spcPts val="400"/>
+        </a:spcAft>
+        <a:buClr>
+          <a:schemeClr val="accent1"/>
+        </a:buClr>
+        <a:buFont typeface="Calibri" pitchFamily="34" charset="0"/>
+        <a:buChar char="◦"/>
+        <a:defRPr sz="1400" kern="1200">
           <a:solidFill>
-            <a:schemeClr val="tx1"/>
+            <a:schemeClr val="tx1">
+              <a:lumMod val="75000"/>
+              <a:lumOff val="25000"/>
+            </a:schemeClr>
           </a:solidFill>
           <a:latin typeface="+mn-lt"/>
           <a:ea typeface="+mn-ea"/>
           <a:cs typeface="+mn-cs"/>
         </a:defRPr>
       </a:lvl6pPr>
-      <a:lvl7pPr marL="2971800" indent="-228600" algn="l" defTabSz="914400" rtl="0" eaLnBrk="1" latinLnBrk="0" hangingPunct="1">
+      <a:lvl7pPr marL="1300000" indent="-228600" algn="l" defTabSz="914400" rtl="0" eaLnBrk="1" latinLnBrk="0" hangingPunct="1">
         <a:lnSpc>
           <a:spcPct val="90000"/>
         </a:lnSpc>
         <a:spcBef>
-          <a:spcPts val="500"/>
+          <a:spcPts val="200"/>
         </a:spcBef>
-        <a:buFont typeface="Arial"/>
-        <a:buChar char="•"/>
-        <a:defRPr sz="1800" kern="1200">
+        <a:spcAft>
+          <a:spcPts val="400"/>
+        </a:spcAft>
+        <a:buClr>
+          <a:schemeClr val="accent1"/>
+        </a:buClr>
+        <a:buFont typeface="Calibri" pitchFamily="34" charset="0"/>
+        <a:buChar char="◦"/>
+        <a:defRPr sz="1400" kern="1200">
           <a:solidFill>
-            <a:schemeClr val="tx1"/>
+            <a:schemeClr val="tx1">
+              <a:lumMod val="75000"/>
+              <a:lumOff val="25000"/>
+            </a:schemeClr>
           </a:solidFill>
           <a:latin typeface="+mn-lt"/>
           <a:ea typeface="+mn-ea"/>
           <a:cs typeface="+mn-cs"/>
         </a:defRPr>
       </a:lvl7pPr>
-      <a:lvl8pPr marL="3429000" indent="-228600" algn="l" defTabSz="914400" rtl="0" eaLnBrk="1" latinLnBrk="0" hangingPunct="1">
+      <a:lvl8pPr marL="1500000" indent="-228600" algn="l" defTabSz="914400" rtl="0" eaLnBrk="1" latinLnBrk="0" hangingPunct="1">
         <a:lnSpc>
           <a:spcPct val="90000"/>
         </a:lnSpc>
         <a:spcBef>
-          <a:spcPts val="500"/>
+          <a:spcPts val="200"/>
         </a:spcBef>
-        <a:buFont typeface="Arial"/>
-        <a:buChar char="•"/>
-        <a:defRPr sz="1800" kern="1200">
+        <a:spcAft>
+          <a:spcPts val="400"/>
+        </a:spcAft>
+        <a:buClr>
+          <a:schemeClr val="accent1"/>
+        </a:buClr>
+        <a:buFont typeface="Calibri" pitchFamily="34" charset="0"/>
+        <a:buChar char="◦"/>
+        <a:defRPr sz="1400" kern="1200">
           <a:solidFill>
-            <a:schemeClr val="tx1"/>
+            <a:schemeClr val="tx1">
+              <a:lumMod val="75000"/>
+              <a:lumOff val="25000"/>
+            </a:schemeClr>
           </a:solidFill>
           <a:latin typeface="+mn-lt"/>
           <a:ea typeface="+mn-ea"/>
           <a:cs typeface="+mn-cs"/>
         </a:defRPr>
       </a:lvl8pPr>
-      <a:lvl9pPr marL="3886200" indent="-228600" algn="l" defTabSz="914400" rtl="0" eaLnBrk="1" latinLnBrk="0" hangingPunct="1">
+      <a:lvl9pPr marL="1700000" indent="-228600" algn="l" defTabSz="914400" rtl="0" eaLnBrk="1" latinLnBrk="0" hangingPunct="1">
         <a:lnSpc>
           <a:spcPct val="90000"/>
         </a:lnSpc>
         <a:spcBef>
-          <a:spcPts val="500"/>
+          <a:spcPts val="200"/>
         </a:spcBef>
-        <a:buFont typeface="Arial"/>
-        <a:buChar char="•"/>
-        <a:defRPr sz="1800" kern="1200">
+        <a:spcAft>
+          <a:spcPts val="400"/>
+        </a:spcAft>
+        <a:buClr>
+          <a:schemeClr val="accent1"/>
+        </a:buClr>
+        <a:buFont typeface="Calibri" pitchFamily="34" charset="0"/>
+        <a:buChar char="◦"/>
+        <a:defRPr sz="1400" kern="1200">
           <a:solidFill>
-            <a:schemeClr val="tx1"/>
+            <a:schemeClr val="tx1">
+              <a:lumMod val="75000"/>
+              <a:lumOff val="25000"/>
+            </a:schemeClr>
           </a:solidFill>
           <a:latin typeface="+mn-lt"/>
           <a:ea typeface="+mn-ea"/>
@@ -2971,108 +3893,107 @@
           <a:chExt cx="0" cy="0"/>
         </a:xfrm>
       </p:grpSpPr>
-      <p:pic>
-        <p:nvPicPr>
-          <p:cNvPr id="4" name="Picture 3"/>
-          <p:cNvPicPr>
-            <a:picLocks noChangeAspect="1"/>
-          </p:cNvPicPr>
+      <p:grpSp>
+        <p:nvGrpSpPr>
+          <p:cNvPr id="7" name="Group 6"/>
+          <p:cNvGrpSpPr/>
           <p:nvPr/>
-        </p:nvPicPr>
-        <p:blipFill>
-          <a:blip r:embed="rId2">
-            <a:alphaModFix/>
-          </a:blip>
-          <a:stretch>
-            <a:fillRect/>
-          </a:stretch>
-        </p:blipFill>
-        <p:spPr>
+        </p:nvGrpSpPr>
+        <p:grpSpPr>
           <a:xfrm>
-            <a:off x="2332538" y="103305"/>
+            <a:off x="2343296" y="289340"/>
             <a:ext cx="6568660" cy="6568660"/>
+            <a:chOff x="2332538" y="103305"/>
+            <a:chExt cx="6568660" cy="6568660"/>
           </a:xfrm>
-          <a:prstGeom prst="rect">
-            <a:avLst/>
-          </a:prstGeom>
-          <a:ln>
-            <a:noFill/>
-          </a:ln>
-          <a:effectLst>
-            <a:outerShdw blurRad="292100" dist="139700" dir="2700000" algn="tl" rotWithShape="0">
-              <a:srgbClr val="333333">
-                <a:alpha val="65000"/>
-              </a:srgbClr>
-            </a:outerShdw>
-          </a:effectLst>
-        </p:spPr>
-      </p:pic>
-      <p:pic>
-        <p:nvPicPr>
-          <p:cNvPr id="5" name="Picture 4"/>
-          <p:cNvPicPr>
-            <a:picLocks noChangeAspect="1"/>
-          </p:cNvPicPr>
-          <p:nvPr/>
-        </p:nvPicPr>
-        <p:blipFill>
-          <a:blip r:embed="rId3">
-            <a:clrChange>
-              <a:clrFrom>
-                <a:srgbClr val="FFFFFF"/>
-              </a:clrFrom>
-              <a:clrTo>
-                <a:srgbClr val="FFFFFF">
-                  <a:alpha val="0"/>
+        </p:grpSpPr>
+        <p:pic>
+          <p:nvPicPr>
+            <p:cNvPr id="4" name="Picture 3"/>
+            <p:cNvPicPr>
+              <a:picLocks noChangeAspect="1"/>
+            </p:cNvPicPr>
+            <p:nvPr/>
+          </p:nvPicPr>
+          <p:blipFill>
+            <a:blip r:embed="rId2">
+              <a:alphaModFix/>
+              <a:duotone>
+                <a:schemeClr val="accent1">
+                  <a:shade val="45000"/>
+                  <a:satMod val="135000"/>
+                </a:schemeClr>
+                <a:prstClr val="white"/>
+              </a:duotone>
+            </a:blip>
+            <a:stretch>
+              <a:fillRect/>
+            </a:stretch>
+          </p:blipFill>
+          <p:spPr>
+            <a:xfrm>
+              <a:off x="2332538" y="103305"/>
+              <a:ext cx="6568660" cy="6568660"/>
+            </a:xfrm>
+            <a:prstGeom prst="rect">
+              <a:avLst/>
+            </a:prstGeom>
+            <a:ln>
+              <a:noFill/>
+            </a:ln>
+            <a:effectLst>
+              <a:outerShdw blurRad="292100" dist="139700" dir="2700000" algn="tl" rotWithShape="0">
+                <a:srgbClr val="333333">
+                  <a:alpha val="65000"/>
                 </a:srgbClr>
-              </a:clrTo>
-            </a:clrChange>
-            <a:alphaModFix/>
-          </a:blip>
-          <a:stretch>
-            <a:fillRect/>
-          </a:stretch>
-        </p:blipFill>
-        <p:spPr>
-          <a:xfrm rot="158011">
-            <a:off x="4489134" y="1500804"/>
-            <a:ext cx="1557265" cy="1515613"/>
-          </a:xfrm>
-          <a:prstGeom prst="rect">
-            <a:avLst/>
-          </a:prstGeom>
-        </p:spPr>
-      </p:pic>
-      <p:sp>
-        <p:nvSpPr>
-          <p:cNvPr id="6" name="TextBox 5"/>
-          <p:cNvSpPr txBox="1"/>
-          <p:nvPr/>
-        </p:nvSpPr>
-        <p:spPr>
-          <a:xfrm>
-            <a:off x="3096691" y="5809130"/>
-            <a:ext cx="5040354" cy="646331"/>
-          </a:xfrm>
-          <a:prstGeom prst="rect">
-            <a:avLst/>
-          </a:prstGeom>
-          <a:noFill/>
-        </p:spPr>
-        <p:txBody>
-          <a:bodyPr wrap="none" rtlCol="0">
-            <a:spAutoFit/>
-          </a:bodyPr>
-          <a:lstStyle/>
-          <a:p>
-            <a:r>
-              <a:rPr lang="en-US" sz="3600" dirty="0" smtClean="0"/>
-              <a:t>TEAM GREEN – MHC-PMS</a:t>
-            </a:r>
-            <a:endParaRPr lang="en-US" sz="3600" dirty="0"/>
-          </a:p>
-        </p:txBody>
-      </p:sp>
+              </a:outerShdw>
+            </a:effectLst>
+          </p:spPr>
+        </p:pic>
+        <p:pic>
+          <p:nvPicPr>
+            <p:cNvPr id="5" name="Picture 4"/>
+            <p:cNvPicPr>
+              <a:picLocks noChangeAspect="1"/>
+            </p:cNvPicPr>
+            <p:nvPr/>
+          </p:nvPicPr>
+          <p:blipFill>
+            <a:blip r:embed="rId3">
+              <a:clrChange>
+                <a:clrFrom>
+                  <a:srgbClr val="FFFFFF"/>
+                </a:clrFrom>
+                <a:clrTo>
+                  <a:srgbClr val="FFFFFF">
+                    <a:alpha val="0"/>
+                  </a:srgbClr>
+                </a:clrTo>
+              </a:clrChange>
+              <a:alphaModFix/>
+              <a:duotone>
+                <a:schemeClr val="accent2">
+                  <a:shade val="45000"/>
+                  <a:satMod val="135000"/>
+                </a:schemeClr>
+                <a:prstClr val="white"/>
+              </a:duotone>
+            </a:blip>
+            <a:stretch>
+              <a:fillRect/>
+            </a:stretch>
+          </p:blipFill>
+          <p:spPr>
+            <a:xfrm rot="158011">
+              <a:off x="4489134" y="1500804"/>
+              <a:ext cx="1557265" cy="1515613"/>
+            </a:xfrm>
+            <a:prstGeom prst="rect">
+              <a:avLst/>
+            </a:prstGeom>
+          </p:spPr>
+        </p:pic>
+      </p:grpSp>
     </p:spTree>
     <p:extLst>
       <p:ext uri="{BB962C8B-B14F-4D97-AF65-F5344CB8AC3E}">
@@ -3217,7 +4138,7 @@
               <a:t> </a:t>
             </a:r>
             <a:r>
-              <a:rPr lang="en-US" smtClean="0"/>
+              <a:rPr lang="en-US" dirty="0" err="1" smtClean="0"/>
               <a:t>vermieden</a:t>
             </a:r>
             <a:endParaRPr lang="en-US" dirty="0" smtClean="0"/>
@@ -4160,9 +5081,9 @@
 </file>
 
 <file path=ppt/theme/theme1.xml><?xml version="1.0" encoding="utf-8"?>
-<a:theme xmlns:a="http://schemas.openxmlformats.org/drawingml/2006/main" name="Office Theme">
+<a:theme xmlns:a="http://schemas.openxmlformats.org/drawingml/2006/main" name="Retrospect">
   <a:themeElements>
-    <a:clrScheme name="Office">
+    <a:clrScheme name="Green Yellow">
       <a:dk1>
         <a:sysClr val="windowText" lastClr="000000"/>
       </a:dk1>
@@ -4170,44 +5091,44 @@
         <a:sysClr val="window" lastClr="FFFFFF"/>
       </a:lt1>
       <a:dk2>
-        <a:srgbClr val="44546A"/>
+        <a:srgbClr val="455F51"/>
       </a:dk2>
       <a:lt2>
-        <a:srgbClr val="E7E6E6"/>
+        <a:srgbClr val="E2DFCC"/>
       </a:lt2>
       <a:accent1>
-        <a:srgbClr val="5B9BD5"/>
+        <a:srgbClr val="99CB38"/>
       </a:accent1>
       <a:accent2>
-        <a:srgbClr val="ED7D31"/>
+        <a:srgbClr val="63A537"/>
       </a:accent2>
       <a:accent3>
-        <a:srgbClr val="A5A5A5"/>
+        <a:srgbClr val="37A76F"/>
       </a:accent3>
       <a:accent4>
-        <a:srgbClr val="FFC000"/>
+        <a:srgbClr val="44C1A3"/>
       </a:accent4>
       <a:accent5>
-        <a:srgbClr val="4472C4"/>
+        <a:srgbClr val="4EB3CF"/>
       </a:accent5>
       <a:accent6>
-        <a:srgbClr val="70AD47"/>
+        <a:srgbClr val="51C3F9"/>
       </a:accent6>
       <a:hlink>
-        <a:srgbClr val="0563C1"/>
+        <a:srgbClr val="EE7B08"/>
       </a:hlink>
       <a:folHlink>
-        <a:srgbClr val="954F72"/>
+        <a:srgbClr val="977B2D"/>
       </a:folHlink>
     </a:clrScheme>
-    <a:fontScheme name="Office">
+    <a:fontScheme name="Retrospect">
       <a:majorFont>
         <a:latin typeface="Calibri Light" panose="020F0302020204030204"/>
         <a:ea typeface=""/>
         <a:cs typeface=""/>
-        <a:font script="Jpan" typeface="Yu Gothic Light"/>
+        <a:font script="Jpan" typeface="ＭＳ Ｐゴシック"/>
         <a:font script="Hang" typeface="맑은 고딕"/>
-        <a:font script="Hans" typeface="DengXian Light"/>
+        <a:font script="Hans" typeface="宋体"/>
         <a:font script="Hant" typeface="新細明體"/>
         <a:font script="Arab" typeface="Times New Roman"/>
         <a:font script="Hebr" typeface="Times New Roman"/>
@@ -4240,9 +5161,9 @@
         <a:latin typeface="Calibri" panose="020F0502020204030204"/>
         <a:ea typeface=""/>
         <a:cs typeface=""/>
-        <a:font script="Jpan" typeface="Yu Gothic"/>
+        <a:font script="Jpan" typeface="ＭＳ Ｐゴシック"/>
         <a:font script="Hang" typeface="맑은 고딕"/>
-        <a:font script="Hans" typeface="DengXian"/>
+        <a:font script="Hans" typeface="宋体"/>
         <a:font script="Hant" typeface="新細明體"/>
         <a:font script="Arab" typeface="Arial"/>
         <a:font script="Hebr" typeface="Arial"/>
@@ -4272,7 +5193,7 @@
         <a:font script="Geor" typeface="Sylfaen"/>
       </a:minorFont>
     </a:fontScheme>
-    <a:fmtScheme name="Office">
+    <a:fmtScheme name="Retrospect">
       <a:fillStyleLst>
         <a:solidFill>
           <a:schemeClr val="phClr"/>
@@ -4281,76 +5202,81 @@
           <a:gsLst>
             <a:gs pos="0">
               <a:schemeClr val="phClr">
-                <a:lumMod val="110000"/>
-                <a:satMod val="105000"/>
-                <a:tint val="67000"/>
+                <a:tint val="65000"/>
+                <a:shade val="92000"/>
+                <a:satMod val="130000"/>
               </a:schemeClr>
             </a:gs>
-            <a:gs pos="50000">
+            <a:gs pos="45000">
               <a:schemeClr val="phClr">
-                <a:lumMod val="105000"/>
-                <a:satMod val="103000"/>
-                <a:tint val="73000"/>
+                <a:tint val="60000"/>
+                <a:shade val="99000"/>
+                <a:satMod val="120000"/>
               </a:schemeClr>
             </a:gs>
             <a:gs pos="100000">
               <a:schemeClr val="phClr">
-                <a:lumMod val="105000"/>
-                <a:satMod val="109000"/>
-                <a:tint val="81000"/>
+                <a:tint val="55000"/>
+                <a:satMod val="140000"/>
               </a:schemeClr>
             </a:gs>
           </a:gsLst>
-          <a:lin ang="5400000" scaled="0"/>
+          <a:path path="circle">
+            <a:fillToRect l="100000" t="100000" r="100000" b="100000"/>
+          </a:path>
         </a:gradFill>
         <a:gradFill rotWithShape="1">
           <a:gsLst>
             <a:gs pos="0">
               <a:schemeClr val="phClr">
-                <a:satMod val="103000"/>
-                <a:lumMod val="102000"/>
-                <a:tint val="94000"/>
+                <a:shade val="85000"/>
+                <a:satMod val="130000"/>
               </a:schemeClr>
             </a:gs>
-            <a:gs pos="50000">
+            <a:gs pos="34000">
               <a:schemeClr val="phClr">
-                <a:satMod val="110000"/>
-                <a:lumMod val="100000"/>
-                <a:shade val="100000"/>
+                <a:shade val="87000"/>
+                <a:satMod val="125000"/>
+              </a:schemeClr>
+            </a:gs>
+            <a:gs pos="70000">
+              <a:schemeClr val="phClr">
+                <a:tint val="100000"/>
+                <a:shade val="90000"/>
+                <a:satMod val="130000"/>
               </a:schemeClr>
             </a:gs>
             <a:gs pos="100000">
               <a:schemeClr val="phClr">
-                <a:lumMod val="99000"/>
-                <a:satMod val="120000"/>
-                <a:shade val="78000"/>
+                <a:tint val="100000"/>
+                <a:shade val="100000"/>
+                <a:satMod val="110000"/>
               </a:schemeClr>
             </a:gs>
           </a:gsLst>
-          <a:lin ang="5400000" scaled="0"/>
+          <a:path path="circle">
+            <a:fillToRect l="100000" t="100000" r="100000" b="100000"/>
+          </a:path>
         </a:gradFill>
       </a:fillStyleLst>
       <a:lnStyleLst>
-        <a:ln w="6350" cap="flat" cmpd="sng" algn="ctr">
-          <a:solidFill>
-            <a:schemeClr val="phClr"/>
-          </a:solidFill>
-          <a:prstDash val="solid"/>
-          <a:miter lim="800000"/>
-        </a:ln>
         <a:ln w="12700" cap="flat" cmpd="sng" algn="ctr">
           <a:solidFill>
             <a:schemeClr val="phClr"/>
           </a:solidFill>
           <a:prstDash val="solid"/>
-          <a:miter lim="800000"/>
         </a:ln>
-        <a:ln w="19050" cap="flat" cmpd="sng" algn="ctr">
+        <a:ln w="15875" cap="flat" cmpd="sng" algn="ctr">
           <a:solidFill>
             <a:schemeClr val="phClr"/>
           </a:solidFill>
           <a:prstDash val="solid"/>
-          <a:miter lim="800000"/>
+        </a:ln>
+        <a:ln w="25400" cap="flat" cmpd="sng" algn="ctr">
+          <a:solidFill>
+            <a:schemeClr val="phClr"/>
+          </a:solidFill>
+          <a:prstDash val="solid"/>
         </a:ln>
       </a:lnStyleLst>
       <a:effectStyleLst>
@@ -4358,16 +5284,33 @@
           <a:effectLst/>
         </a:effectStyle>
         <a:effectStyle>
-          <a:effectLst/>
+          <a:effectLst>
+            <a:outerShdw blurRad="38100" dist="25400" dir="2700000" algn="br" rotWithShape="0">
+              <a:srgbClr val="000000">
+                <a:alpha val="60000"/>
+              </a:srgbClr>
+            </a:outerShdw>
+          </a:effectLst>
         </a:effectStyle>
         <a:effectStyle>
           <a:effectLst>
-            <a:outerShdw blurRad="57150" dist="19050" dir="5400000" algn="ctr" rotWithShape="0">
+            <a:outerShdw blurRad="44450" dist="25400" dir="2700000" algn="br" rotWithShape="0">
               <a:srgbClr val="000000">
-                <a:alpha val="63000"/>
+                <a:alpha val="60000"/>
               </a:srgbClr>
             </a:outerShdw>
           </a:effectLst>
+          <a:scene3d>
+            <a:camera prst="orthographicFront">
+              <a:rot lat="0" lon="0" rev="0"/>
+            </a:camera>
+            <a:lightRig rig="threePt" dir="t">
+              <a:rot lat="0" lon="0" rev="19800000"/>
+            </a:lightRig>
+          </a:scene3d>
+          <a:sp3d prstMaterial="flat">
+            <a:bevelT w="25400" h="31750"/>
+          </a:sp3d>
         </a:effectStyle>
       </a:effectStyleLst>
       <a:bgFillStyleLst>
@@ -4376,36 +5319,36 @@
         </a:solidFill>
         <a:solidFill>
           <a:schemeClr val="phClr">
-            <a:tint val="95000"/>
-            <a:satMod val="170000"/>
+            <a:tint val="90000"/>
+            <a:shade val="97000"/>
+            <a:satMod val="130000"/>
           </a:schemeClr>
         </a:solidFill>
         <a:gradFill rotWithShape="1">
           <a:gsLst>
             <a:gs pos="0">
               <a:schemeClr val="phClr">
-                <a:tint val="93000"/>
-                <a:satMod val="150000"/>
-                <a:shade val="98000"/>
-                <a:lumMod val="102000"/>
+                <a:tint val="96000"/>
+                <a:shade val="99000"/>
+                <a:satMod val="140000"/>
               </a:schemeClr>
             </a:gs>
-            <a:gs pos="50000">
+            <a:gs pos="65000">
               <a:schemeClr val="phClr">
-                <a:tint val="98000"/>
+                <a:tint val="100000"/>
+                <a:shade val="80000"/>
                 <a:satMod val="130000"/>
-                <a:shade val="90000"/>
-                <a:lumMod val="103000"/>
               </a:schemeClr>
             </a:gs>
             <a:gs pos="100000">
               <a:schemeClr val="phClr">
-                <a:shade val="63000"/>
+                <a:tint val="100000"/>
+                <a:shade val="48000"/>
                 <a:satMod val="120000"/>
               </a:schemeClr>
             </a:gs>
           </a:gsLst>
-          <a:lin ang="5400000" scaled="0"/>
+          <a:lin ang="16200000" scaled="0"/>
         </a:gradFill>
       </a:bgFillStyleLst>
     </a:fmtScheme>
@@ -4414,7 +5357,7 @@
   <a:extraClrSchemeLst/>
   <a:extLst>
     <a:ext uri="{05A4C25C-085E-4340-85A3-A5531E510DB2}">
-      <thm15:themeFamily xmlns:thm15="http://schemas.microsoft.com/office/thememl/2012/main" name="Office Theme" id="{62F939B6-93AF-4DB8-9C6B-D6C7DFDC589F}" vid="{4A3C46E8-61CC-4603-A589-7422A47A8E4A}"/>
+      <thm15:themeFamily xmlns:thm15="http://schemas.microsoft.com/office/thememl/2012/main" name="Retrospect" id="{5F128B03-DCCA-4EEB-AB3B-CF2899314A46}" vid="{3F1AAB62-24C6-49D2-8E01-B56FAC9A3DCD}"/>
     </a:ext>
   </a:extLst>
 </a:theme>

</xml_diff>